<commit_message>
Updated pptx and img
</commit_message>
<xml_diff>
--- a/presentation/bit Composer.pptx
+++ b/presentation/bit Composer.pptx
@@ -5,7 +5,7 @@
     <p:sldMasterId id="2147483696" r:id="rId1"/>
   </p:sldMasterIdLst>
   <p:notesMasterIdLst>
-    <p:notesMasterId r:id="rId14"/>
+    <p:notesMasterId r:id="rId15"/>
   </p:notesMasterIdLst>
   <p:sldIdLst>
     <p:sldId id="259" r:id="rId2"/>
@@ -17,9 +17,10 @@
     <p:sldId id="262" r:id="rId8"/>
     <p:sldId id="263" r:id="rId9"/>
     <p:sldId id="269" r:id="rId10"/>
-    <p:sldId id="277" r:id="rId11"/>
-    <p:sldId id="265" r:id="rId12"/>
-    <p:sldId id="266" r:id="rId13"/>
+    <p:sldId id="278" r:id="rId11"/>
+    <p:sldId id="279" r:id="rId12"/>
+    <p:sldId id="265" r:id="rId13"/>
+    <p:sldId id="266" r:id="rId14"/>
   </p:sldIdLst>
   <p:sldSz cx="12192000" cy="6858000"/>
   <p:notesSz cx="6858000" cy="9144000"/>
@@ -128,7 +129,7 @@
 
 <file path=ppt/commentAuthors.xml><?xml version="1.0" encoding="utf-8"?>
 <p:cmAuthorLst xmlns:a="http://schemas.openxmlformats.org/drawingml/2006/main" xmlns:r="http://schemas.openxmlformats.org/officeDocument/2006/relationships" xmlns:p="http://schemas.openxmlformats.org/presentationml/2006/main">
-  <p:cmAuthor id="1" name="吉川 孟志" initials="吉川" lastIdx="1" clrIdx="0">
+  <p:cmAuthor id="1" name="吉川 孟志" initials="吉川" lastIdx="4" clrIdx="0">
     <p:extLst>
       <p:ext uri="{19B8F6BF-5375-455C-9EA6-DF929625EA0E}">
         <p15:presenceInfo xmlns:p15="http://schemas.microsoft.com/office/powerpoint/2012/main" userId="S-1-5-21-4206470692-4146437883-2304300903-2492" providerId="AD"/>
@@ -140,10 +141,52 @@
 
 <file path=ppt/comments/comment1.xml><?xml version="1.0" encoding="utf-8"?>
 <p:cmLst xmlns:a="http://schemas.openxmlformats.org/drawingml/2006/main" xmlns:r="http://schemas.openxmlformats.org/officeDocument/2006/relationships" xmlns:p="http://schemas.openxmlformats.org/presentationml/2006/main">
-  <p:cm authorId="1" dt="2021-10-05T13:50:07.738" idx="1">
-    <p:pos x="597" y="2802"/>
-    <p:text>ここにmidiの説明を入れる</p:text>
-    <p:extLst mod="1">
+  <p:cm authorId="1" dt="2021-10-06T10:23:15.467" idx="2">
+    <p:pos x="7435" y="26"/>
+    <p:text>図つける</p:text>
+    <p:extLst>
+      <p:ext uri="{C676402C-5697-4E1C-873F-D02D1690AC5C}">
+        <p15:threadingInfo xmlns:p15="http://schemas.microsoft.com/office/powerpoint/2012/main" timeZoneBias="-540"/>
+      </p:ext>
+    </p:extLst>
+  </p:cm>
+</p:cmLst>
+</file>
+
+<file path=ppt/comments/comment2.xml><?xml version="1.0" encoding="utf-8"?>
+<p:cmLst xmlns:a="http://schemas.openxmlformats.org/drawingml/2006/main" xmlns:r="http://schemas.openxmlformats.org/officeDocument/2006/relationships" xmlns:p="http://schemas.openxmlformats.org/presentationml/2006/main">
+  <p:cm authorId="1" dt="2021-10-06T10:23:47.699" idx="3">
+    <p:pos x="7427" y="34"/>
+    <p:text>図つける</p:text>
+    <p:extLst>
+      <p:ext uri="{C676402C-5697-4E1C-873F-D02D1690AC5C}">
+        <p15:threadingInfo xmlns:p15="http://schemas.microsoft.com/office/powerpoint/2012/main" timeZoneBias="-540"/>
+      </p:ext>
+    </p:extLst>
+  </p:cm>
+</p:cmLst>
+</file>
+
+<file path=ppt/comments/comment3.xml><?xml version="1.0" encoding="utf-8"?>
+<p:cmLst xmlns:a="http://schemas.openxmlformats.org/drawingml/2006/main" xmlns:r="http://schemas.openxmlformats.org/officeDocument/2006/relationships" xmlns:p="http://schemas.openxmlformats.org/presentationml/2006/main">
+  <p:cm authorId="1" dt="2021-10-06T10:23:47.699" idx="3">
+    <p:pos x="7427" y="34"/>
+    <p:text>図つける</p:text>
+    <p:extLst>
+      <p:ext uri="{C676402C-5697-4E1C-873F-D02D1690AC5C}">
+        <p15:threadingInfo xmlns:p15="http://schemas.microsoft.com/office/powerpoint/2012/main" timeZoneBias="-540"/>
+      </p:ext>
+    </p:extLst>
+  </p:cm>
+</p:cmLst>
+</file>
+
+<file path=ppt/comments/comment4.xml><?xml version="1.0" encoding="utf-8"?>
+<p:cmLst xmlns:a="http://schemas.openxmlformats.org/drawingml/2006/main" xmlns:r="http://schemas.openxmlformats.org/officeDocument/2006/relationships" xmlns:p="http://schemas.openxmlformats.org/presentationml/2006/main">
+  <p:cm authorId="1" dt="2021-10-06T14:31:02.285" idx="4">
+    <p:pos x="1029" y="2030"/>
+    <p:text>これからやることに変更</p:text>
+    <p:extLst>
       <p:ext uri="{C676402C-5697-4E1C-873F-D02D1690AC5C}">
         <p15:threadingInfo xmlns:p15="http://schemas.microsoft.com/office/powerpoint/2012/main" timeZoneBias="-540"/>
       </p:ext>
@@ -691,14 +734,7 @@
             </a:r>
             <a:r>
               <a:rPr kumimoji="1" lang="ja-JP" altLang="en-US" dirty="0"/>
-              <a:t>を使った自動作曲アプリです。ゲームに使われる音楽に雰囲気の似た曲を作曲します。</a:t>
-            </a:r>
-            <a:endParaRPr kumimoji="1" lang="en-US" altLang="ja-JP" dirty="0"/>
-          </a:p>
-          <a:p>
-            <a:r>
-              <a:rPr kumimoji="1" lang="ja-JP" altLang="en-US" dirty="0"/>
-              <a:t>例としてはスーパーマリオブラザーズやドラゴンクエストの曲などをほうふつとさせるような曲を作曲します。</a:t>
+              <a:t>を使った自動作曲アプリです。例としてはスーパーマリオブラザーズやドラゴンクエストの曲などをほうふつとさせるような曲を作曲します。</a:t>
             </a:r>
           </a:p>
         </p:txBody>
@@ -783,22 +819,7 @@
           <a:bodyPr/>
           <a:lstStyle/>
           <a:p>
-            <a:r>
-              <a:rPr kumimoji="1" lang="en-US" altLang="ja-JP" dirty="0"/>
-              <a:t>bit composer</a:t>
-            </a:r>
-            <a:r>
-              <a:rPr kumimoji="1" lang="ja-JP" altLang="en-US" dirty="0"/>
-              <a:t>は</a:t>
-            </a:r>
-            <a:r>
-              <a:rPr kumimoji="1" lang="en-US" altLang="ja-JP" dirty="0"/>
-              <a:t>Web</a:t>
-            </a:r>
-            <a:r>
-              <a:rPr kumimoji="1" lang="ja-JP" altLang="en-US" dirty="0"/>
-              <a:t>アプリケーションとして成り立っており、</a:t>
-            </a:r>
+            <a:endParaRPr kumimoji="1" lang="ja-JP" altLang="en-US" dirty="0"/>
           </a:p>
         </p:txBody>
       </p:sp>
@@ -1143,13 +1164,13 @@
   <p:clrMapOvr>
     <a:masterClrMapping/>
   </p:clrMapOvr>
-  <mc:AlternateContent xmlns:mc="http://schemas.openxmlformats.org/markup-compatibility/2006">
-    <mc:Choice xmlns:p14="http://schemas.microsoft.com/office/powerpoint/2010/main" Requires="p14">
+  <mc:AlternateContent xmlns:mc="http://schemas.openxmlformats.org/markup-compatibility/2006" xmlns:p14="http://schemas.microsoft.com/office/powerpoint/2010/main">
+    <mc:Choice Requires="p14">
       <p:transition spd="slow" p14:dur="800">
         <p:circle/>
       </p:transition>
     </mc:Choice>
-    <mc:Fallback>
+    <mc:Fallback xmlns="">
       <p:transition spd="slow">
         <p:circle/>
       </p:transition>
@@ -1385,13 +1406,13 @@
   <p:clrMapOvr>
     <a:masterClrMapping/>
   </p:clrMapOvr>
-  <mc:AlternateContent xmlns:mc="http://schemas.openxmlformats.org/markup-compatibility/2006">
-    <mc:Choice xmlns:p14="http://schemas.microsoft.com/office/powerpoint/2010/main" Requires="p14">
+  <mc:AlternateContent xmlns:mc="http://schemas.openxmlformats.org/markup-compatibility/2006" xmlns:p14="http://schemas.microsoft.com/office/powerpoint/2010/main">
+    <mc:Choice Requires="p14">
       <p:transition spd="slow" p14:dur="800">
         <p:circle/>
       </p:transition>
     </mc:Choice>
-    <mc:Fallback>
+    <mc:Fallback xmlns="">
       <p:transition spd="slow">
         <p:circle/>
       </p:transition>
@@ -1637,13 +1658,13 @@
   <p:clrMapOvr>
     <a:masterClrMapping/>
   </p:clrMapOvr>
-  <mc:AlternateContent xmlns:mc="http://schemas.openxmlformats.org/markup-compatibility/2006">
-    <mc:Choice xmlns:p14="http://schemas.microsoft.com/office/powerpoint/2010/main" Requires="p14">
+  <mc:AlternateContent xmlns:mc="http://schemas.openxmlformats.org/markup-compatibility/2006" xmlns:p14="http://schemas.microsoft.com/office/powerpoint/2010/main">
+    <mc:Choice Requires="p14">
       <p:transition spd="slow" p14:dur="800">
         <p:circle/>
       </p:transition>
     </mc:Choice>
-    <mc:Fallback>
+    <mc:Fallback xmlns="">
       <p:transition spd="slow">
         <p:circle/>
       </p:transition>
@@ -1879,13 +1900,13 @@
   <p:clrMapOvr>
     <a:masterClrMapping/>
   </p:clrMapOvr>
-  <mc:AlternateContent xmlns:mc="http://schemas.openxmlformats.org/markup-compatibility/2006">
-    <mc:Choice xmlns:p14="http://schemas.microsoft.com/office/powerpoint/2010/main" Requires="p14">
+  <mc:AlternateContent xmlns:mc="http://schemas.openxmlformats.org/markup-compatibility/2006" xmlns:p14="http://schemas.microsoft.com/office/powerpoint/2010/main">
+    <mc:Choice Requires="p14">
       <p:transition spd="slow" p14:dur="800">
         <p:circle/>
       </p:transition>
     </mc:Choice>
-    <mc:Fallback>
+    <mc:Fallback xmlns="">
       <p:transition spd="slow">
         <p:circle/>
       </p:transition>
@@ -2166,13 +2187,13 @@
   <p:clrMapOvr>
     <a:masterClrMapping/>
   </p:clrMapOvr>
-  <mc:AlternateContent xmlns:mc="http://schemas.openxmlformats.org/markup-compatibility/2006">
-    <mc:Choice xmlns:p14="http://schemas.microsoft.com/office/powerpoint/2010/main" Requires="p14">
+  <mc:AlternateContent xmlns:mc="http://schemas.openxmlformats.org/markup-compatibility/2006" xmlns:p14="http://schemas.microsoft.com/office/powerpoint/2010/main">
+    <mc:Choice Requires="p14">
       <p:transition spd="slow" p14:dur="800">
         <p:circle/>
       </p:transition>
     </mc:Choice>
-    <mc:Fallback>
+    <mc:Fallback xmlns="">
       <p:transition spd="slow">
         <p:circle/>
       </p:transition>
@@ -2507,13 +2528,13 @@
   <p:clrMapOvr>
     <a:masterClrMapping/>
   </p:clrMapOvr>
-  <mc:AlternateContent xmlns:mc="http://schemas.openxmlformats.org/markup-compatibility/2006">
-    <mc:Choice xmlns:p14="http://schemas.microsoft.com/office/powerpoint/2010/main" Requires="p14">
+  <mc:AlternateContent xmlns:mc="http://schemas.openxmlformats.org/markup-compatibility/2006" xmlns:p14="http://schemas.microsoft.com/office/powerpoint/2010/main">
+    <mc:Choice Requires="p14">
       <p:transition spd="slow" p14:dur="800">
         <p:circle/>
       </p:transition>
     </mc:Choice>
-    <mc:Fallback>
+    <mc:Fallback xmlns="">
       <p:transition spd="slow">
         <p:circle/>
       </p:transition>
@@ -2995,13 +3016,13 @@
   <p:clrMapOvr>
     <a:masterClrMapping/>
   </p:clrMapOvr>
-  <mc:AlternateContent xmlns:mc="http://schemas.openxmlformats.org/markup-compatibility/2006">
-    <mc:Choice xmlns:p14="http://schemas.microsoft.com/office/powerpoint/2010/main" Requires="p14">
+  <mc:AlternateContent xmlns:mc="http://schemas.openxmlformats.org/markup-compatibility/2006" xmlns:p14="http://schemas.microsoft.com/office/powerpoint/2010/main">
+    <mc:Choice Requires="p14">
       <p:transition spd="slow" p14:dur="800">
         <p:circle/>
       </p:transition>
     </mc:Choice>
-    <mc:Fallback>
+    <mc:Fallback xmlns="">
       <p:transition spd="slow">
         <p:circle/>
       </p:transition>
@@ -3148,13 +3169,13 @@
   <p:clrMapOvr>
     <a:masterClrMapping/>
   </p:clrMapOvr>
-  <mc:AlternateContent xmlns:mc="http://schemas.openxmlformats.org/markup-compatibility/2006">
-    <mc:Choice xmlns:p14="http://schemas.microsoft.com/office/powerpoint/2010/main" Requires="p14">
+  <mc:AlternateContent xmlns:mc="http://schemas.openxmlformats.org/markup-compatibility/2006" xmlns:p14="http://schemas.microsoft.com/office/powerpoint/2010/main">
+    <mc:Choice Requires="p14">
       <p:transition spd="slow" p14:dur="800">
         <p:circle/>
       </p:transition>
     </mc:Choice>
-    <mc:Fallback>
+    <mc:Fallback xmlns="">
       <p:transition spd="slow">
         <p:circle/>
       </p:transition>
@@ -3273,13 +3294,13 @@
   <p:clrMapOvr>
     <a:masterClrMapping/>
   </p:clrMapOvr>
-  <mc:AlternateContent xmlns:mc="http://schemas.openxmlformats.org/markup-compatibility/2006">
-    <mc:Choice xmlns:p14="http://schemas.microsoft.com/office/powerpoint/2010/main" Requires="p14">
+  <mc:AlternateContent xmlns:mc="http://schemas.openxmlformats.org/markup-compatibility/2006" xmlns:p14="http://schemas.microsoft.com/office/powerpoint/2010/main">
+    <mc:Choice Requires="p14">
       <p:transition spd="slow" p14:dur="800">
         <p:circle/>
       </p:transition>
     </mc:Choice>
-    <mc:Fallback>
+    <mc:Fallback xmlns="">
       <p:transition spd="slow">
         <p:circle/>
       </p:transition>
@@ -3628,13 +3649,13 @@
   <p:clrMapOvr>
     <a:masterClrMapping/>
   </p:clrMapOvr>
-  <mc:AlternateContent xmlns:mc="http://schemas.openxmlformats.org/markup-compatibility/2006">
-    <mc:Choice xmlns:p14="http://schemas.microsoft.com/office/powerpoint/2010/main" Requires="p14">
+  <mc:AlternateContent xmlns:mc="http://schemas.openxmlformats.org/markup-compatibility/2006" xmlns:p14="http://schemas.microsoft.com/office/powerpoint/2010/main">
+    <mc:Choice Requires="p14">
       <p:transition spd="slow" p14:dur="800">
         <p:circle/>
       </p:transition>
     </mc:Choice>
-    <mc:Fallback>
+    <mc:Fallback xmlns="">
       <p:transition spd="slow">
         <p:circle/>
       </p:transition>
@@ -3928,13 +3949,13 @@
   <p:clrMapOvr>
     <a:masterClrMapping/>
   </p:clrMapOvr>
-  <mc:AlternateContent xmlns:mc="http://schemas.openxmlformats.org/markup-compatibility/2006">
-    <mc:Choice xmlns:p14="http://schemas.microsoft.com/office/powerpoint/2010/main" Requires="p14">
+  <mc:AlternateContent xmlns:mc="http://schemas.openxmlformats.org/markup-compatibility/2006" xmlns:p14="http://schemas.microsoft.com/office/powerpoint/2010/main">
+    <mc:Choice Requires="p14">
       <p:transition spd="slow" p14:dur="800">
         <p:circle/>
       </p:transition>
     </mc:Choice>
-    <mc:Fallback>
+    <mc:Fallback xmlns="">
       <p:transition spd="slow">
         <p:circle/>
       </p:transition>
@@ -4260,13 +4281,13 @@
     <p:sldLayoutId id="2147483706" r:id="rId10"/>
     <p:sldLayoutId id="2147483707" r:id="rId11"/>
   </p:sldLayoutIdLst>
-  <mc:AlternateContent xmlns:mc="http://schemas.openxmlformats.org/markup-compatibility/2006">
-    <mc:Choice xmlns:p14="http://schemas.microsoft.com/office/powerpoint/2010/main" Requires="p14">
+  <mc:AlternateContent xmlns:mc="http://schemas.openxmlformats.org/markup-compatibility/2006" xmlns:p14="http://schemas.microsoft.com/office/powerpoint/2010/main">
+    <mc:Choice Requires="p14">
       <p:transition spd="slow" p14:dur="800">
         <p:circle/>
       </p:transition>
     </mc:Choice>
-    <mc:Fallback>
+    <mc:Fallback xmlns="">
       <p:transition spd="slow">
         <p:circle/>
       </p:transition>
@@ -4621,7 +4642,7 @@
         </p:nvSpPr>
         <p:spPr>
           <a:xfrm>
-            <a:off x="3413351" y="4538733"/>
+            <a:off x="3431114" y="4410396"/>
             <a:ext cx="4206649" cy="2062103"/>
           </a:xfrm>
           <a:prstGeom prst="rect">
@@ -4651,11 +4672,7 @@
           <a:p>
             <a:r>
               <a:rPr lang="ja-JP" altLang="en-US" sz="3200" dirty="0"/>
-              <a:t>吉川</a:t>
-            </a:r>
-            <a:r>
-              <a:rPr lang="ja-JP" altLang="en-US" sz="3200"/>
-              <a:t>　孟志</a:t>
+              <a:t>吉川　孟志</a:t>
             </a:r>
             <a:endParaRPr lang="en-US" altLang="ja-JP" sz="3200" dirty="0"/>
           </a:p>
@@ -4677,13 +4694,13 @@
   <p:clrMapOvr>
     <a:masterClrMapping/>
   </p:clrMapOvr>
-  <mc:AlternateContent xmlns:mc="http://schemas.openxmlformats.org/markup-compatibility/2006">
-    <mc:Choice xmlns:p14="http://schemas.microsoft.com/office/powerpoint/2010/main" Requires="p14">
+  <mc:AlternateContent xmlns:mc="http://schemas.openxmlformats.org/markup-compatibility/2006" xmlns:p14="http://schemas.microsoft.com/office/powerpoint/2010/main">
+    <mc:Choice Requires="p14">
       <p:transition spd="slow" p14:dur="800">
         <p:circle/>
       </p:transition>
     </mc:Choice>
-    <mc:Fallback>
+    <mc:Fallback xmlns="">
       <p:transition spd="slow">
         <p:circle/>
       </p:transition>
@@ -4714,7 +4731,7 @@
           <p:cNvPr id="2" name="タイトル 1">
             <a:extLst>
               <a:ext uri="{FF2B5EF4-FFF2-40B4-BE49-F238E27FC236}">
-                <a16:creationId xmlns:a16="http://schemas.microsoft.com/office/drawing/2014/main" id="{F9DAB316-4A00-468F-994D-6D2C4AC24AF5}"/>
+                <a16:creationId xmlns:a16="http://schemas.microsoft.com/office/drawing/2014/main" id="{904D9B58-A2D0-4AE0-ACB1-B99F0E966F13}"/>
               </a:ext>
             </a:extLst>
           </p:cNvPr>
@@ -4732,11 +4749,11 @@
           <a:p>
             <a:r>
               <a:rPr kumimoji="1" lang="en-US" altLang="ja-JP" dirty="0"/>
-              <a:t>AI</a:t>
+              <a:t>RNN</a:t>
             </a:r>
             <a:r>
               <a:rPr kumimoji="1" lang="ja-JP" altLang="en-US" dirty="0"/>
-              <a:t>のプログラム</a:t>
+              <a:t>について</a:t>
             </a:r>
           </a:p>
         </p:txBody>
@@ -4746,7 +4763,7 @@
           <p:cNvPr id="3" name="コンテンツ プレースホルダー 2">
             <a:extLst>
               <a:ext uri="{FF2B5EF4-FFF2-40B4-BE49-F238E27FC236}">
-                <a16:creationId xmlns:a16="http://schemas.microsoft.com/office/drawing/2014/main" id="{4417CF7E-6C0A-4D0C-B5B2-C3BC5E906F32}"/>
+                <a16:creationId xmlns:a16="http://schemas.microsoft.com/office/drawing/2014/main" id="{C9EE656D-F3C4-4F7B-8C18-5A59AB846A58}"/>
               </a:ext>
             </a:extLst>
           </p:cNvPr>
@@ -4757,114 +4774,48 @@
             <p:ph idx="1"/>
           </p:nvPr>
         </p:nvSpPr>
-        <p:spPr/>
-        <p:txBody>
-          <a:bodyPr>
-            <a:normAutofit lnSpcReduction="10000"/>
-          </a:bodyPr>
-          <a:lstStyle/>
-          <a:p>
-            <a:r>
-              <a:rPr lang="en-US" altLang="ja-JP" dirty="0"/>
-              <a:t>Python</a:t>
+        <p:spPr>
+          <a:xfrm>
+            <a:off x="291663" y="1415721"/>
+            <a:ext cx="10515600" cy="4351338"/>
+          </a:xfrm>
+        </p:spPr>
+        <p:txBody>
+          <a:bodyPr/>
+          <a:lstStyle/>
+          <a:p>
+            <a:r>
+              <a:rPr kumimoji="1" lang="ja-JP" altLang="en-US" dirty="0"/>
+              <a:t>ある時点の出力を次の</a:t>
             </a:r>
             <a:r>
               <a:rPr lang="ja-JP" altLang="en-US" dirty="0"/>
-              <a:t>で実装</a:t>
-            </a:r>
-            <a:endParaRPr lang="en-US" altLang="ja-JP" dirty="0"/>
-          </a:p>
-          <a:p>
-            <a:endParaRPr lang="en-US" altLang="ja-JP" dirty="0"/>
-          </a:p>
-          <a:p>
-            <a:r>
-              <a:rPr lang="en-US" altLang="ja-JP" dirty="0"/>
-              <a:t>TensorFlow</a:t>
-            </a:r>
-          </a:p>
-          <a:p>
-            <a:pPr lvl="1"/>
-            <a:r>
-              <a:rPr kumimoji="1" lang="en-US" altLang="ja-JP" dirty="0"/>
-              <a:t>LSTM</a:t>
+              <a:t>時点の</a:t>
             </a:r>
             <a:r>
               <a:rPr kumimoji="1" lang="ja-JP" altLang="en-US" dirty="0"/>
-              <a:t>を用いた</a:t>
-            </a:r>
-            <a:r>
-              <a:rPr kumimoji="1" lang="en-US" altLang="ja-JP" dirty="0"/>
-              <a:t>DNN</a:t>
-            </a:r>
-            <a:r>
-              <a:rPr kumimoji="1" lang="ja-JP" altLang="en-US" dirty="0"/>
-              <a:t>を作るためのライブラリ</a:t>
-            </a:r>
-            <a:endParaRPr kumimoji="1" lang="en-US" altLang="ja-JP" dirty="0"/>
-          </a:p>
-          <a:p>
-            <a:pPr lvl="1"/>
-            <a:endParaRPr kumimoji="1" lang="en-US" altLang="ja-JP" dirty="0"/>
-          </a:p>
-          <a:p>
-            <a:r>
-              <a:rPr lang="en-US" altLang="ja-JP" dirty="0"/>
-              <a:t>music21</a:t>
-            </a:r>
-          </a:p>
-          <a:p>
-            <a:pPr lvl="1"/>
-            <a:r>
-              <a:rPr lang="en-US" altLang="ja-JP" dirty="0"/>
-              <a:t>midi</a:t>
-            </a:r>
-            <a:r>
-              <a:rPr lang="ja-JP" altLang="en-US" dirty="0"/>
-              <a:t>の音データを取り出すためのライブラリ</a:t>
-            </a:r>
-            <a:endParaRPr lang="en-US" altLang="ja-JP" dirty="0"/>
-          </a:p>
-          <a:p>
-            <a:endParaRPr kumimoji="1" lang="en-US" altLang="ja-JP" dirty="0"/>
-          </a:p>
-          <a:p>
-            <a:pPr marL="457200" lvl="1" indent="0">
-              <a:buNone/>
-            </a:pPr>
-            <a:endParaRPr lang="en-US" altLang="ja-JP" dirty="0"/>
-          </a:p>
-          <a:p>
-            <a:pPr marL="457200" lvl="1" indent="0">
-              <a:buNone/>
-            </a:pPr>
-            <a:r>
-              <a:rPr kumimoji="1" lang="en-US" altLang="ja-JP" dirty="0"/>
-              <a:t> 		</a:t>
-            </a:r>
-          </a:p>
-          <a:p>
-            <a:endParaRPr kumimoji="1" lang="ja-JP" altLang="en-US" dirty="0"/>
+              <a:t>入力と合わせることで、時系列ごとに適した出力ができるようになる</a:t>
+            </a:r>
           </a:p>
         </p:txBody>
       </p:sp>
     </p:spTree>
     <p:extLst>
       <p:ext uri="{BB962C8B-B14F-4D97-AF65-F5344CB8AC3E}">
-        <p14:creationId xmlns:p14="http://schemas.microsoft.com/office/powerpoint/2010/main" val="3512944444"/>
+        <p14:creationId xmlns:p14="http://schemas.microsoft.com/office/powerpoint/2010/main" val="1523673220"/>
       </p:ext>
     </p:extLst>
   </p:cSld>
   <p:clrMapOvr>
     <a:masterClrMapping/>
   </p:clrMapOvr>
-  <mc:AlternateContent xmlns:mc="http://schemas.openxmlformats.org/markup-compatibility/2006">
-    <mc:Choice xmlns:p14="http://schemas.microsoft.com/office/powerpoint/2010/main" Requires="p14">
+  <mc:AlternateContent xmlns:mc="http://schemas.openxmlformats.org/markup-compatibility/2006" xmlns:p14="http://schemas.microsoft.com/office/powerpoint/2010/main">
+    <mc:Choice Requires="p14">
       <p:transition spd="slow" p14:dur="800">
         <p:circle/>
       </p:transition>
     </mc:Choice>
-    <mc:Fallback>
+    <mc:Fallback xmlns="">
       <p:transition spd="slow">
         <p:circle/>
       </p:transition>
@@ -4895,149 +4846,100 @@
           <p:cNvPr id="2" name="タイトル 1">
             <a:extLst>
               <a:ext uri="{FF2B5EF4-FFF2-40B4-BE49-F238E27FC236}">
-                <a16:creationId xmlns:a16="http://schemas.microsoft.com/office/drawing/2014/main" id="{99218024-A4EE-4EEA-8916-177105FDF5DB}"/>
-              </a:ext>
-            </a:extLst>
-          </p:cNvPr>
-          <p:cNvSpPr>
-            <a:spLocks noGrp="1"/>
-          </p:cNvSpPr>
-          <p:nvPr>
-            <p:ph type="ctrTitle"/>
+                <a16:creationId xmlns:a16="http://schemas.microsoft.com/office/drawing/2014/main" id="{E4883A0A-8D8C-4B9C-B52B-0F6D514B04E0}"/>
+              </a:ext>
+            </a:extLst>
+          </p:cNvPr>
+          <p:cNvSpPr>
+            <a:spLocks noGrp="1"/>
+          </p:cNvSpPr>
+          <p:nvPr>
+            <p:ph type="title"/>
+          </p:nvPr>
+        </p:nvSpPr>
+        <p:spPr/>
+        <p:txBody>
+          <a:bodyPr/>
+          <a:lstStyle/>
+          <a:p>
+            <a:r>
+              <a:rPr kumimoji="1" lang="en-US" altLang="ja-JP" dirty="0"/>
+              <a:t>LSTM (</a:t>
+            </a:r>
+            <a:r>
+              <a:rPr lang="ja-JP" altLang="en-US" dirty="0"/>
+              <a:t>長・短期記憶</a:t>
+            </a:r>
+            <a:r>
+              <a:rPr kumimoji="1" lang="en-US" altLang="ja-JP" dirty="0"/>
+              <a:t>)</a:t>
+            </a:r>
+            <a:r>
+              <a:rPr kumimoji="1" lang="ja-JP" altLang="en-US" dirty="0"/>
+              <a:t>について</a:t>
+            </a:r>
+          </a:p>
+        </p:txBody>
+      </p:sp>
+      <p:sp>
+        <p:nvSpPr>
+          <p:cNvPr id="3" name="コンテンツ プレースホルダー 2">
+            <a:extLst>
+              <a:ext uri="{FF2B5EF4-FFF2-40B4-BE49-F238E27FC236}">
+                <a16:creationId xmlns:a16="http://schemas.microsoft.com/office/drawing/2014/main" id="{9AB6985F-E57D-4069-BD74-D0C7F1F9B720}"/>
+              </a:ext>
+            </a:extLst>
+          </p:cNvPr>
+          <p:cNvSpPr>
+            <a:spLocks noGrp="1"/>
+          </p:cNvSpPr>
+          <p:nvPr>
+            <p:ph idx="1"/>
           </p:nvPr>
         </p:nvSpPr>
         <p:spPr>
           <a:xfrm>
-            <a:off x="228600" y="152400"/>
-            <a:ext cx="9144000" cy="1892300"/>
+            <a:off x="838200" y="1901372"/>
+            <a:ext cx="10515601" cy="3817258"/>
           </a:xfrm>
         </p:spPr>
         <p:txBody>
           <a:bodyPr/>
           <a:lstStyle/>
           <a:p>
-            <a:pPr algn="l"/>
-            <a:r>
-              <a:rPr lang="ja-JP" altLang="en-US" b="1" dirty="0"/>
-              <a:t>現在の進捗状況</a:t>
-            </a:r>
-            <a:br>
-              <a:rPr lang="ja-JP" altLang="en-US" b="1" dirty="0"/>
-            </a:br>
-            <a:endParaRPr kumimoji="1" lang="ja-JP" altLang="en-US" dirty="0"/>
-          </a:p>
-        </p:txBody>
-      </p:sp>
-      <p:sp>
-        <p:nvSpPr>
-          <p:cNvPr id="3" name="字幕 2">
-            <a:extLst>
-              <a:ext uri="{FF2B5EF4-FFF2-40B4-BE49-F238E27FC236}">
-                <a16:creationId xmlns:a16="http://schemas.microsoft.com/office/drawing/2014/main" id="{A731940E-22B5-4EFD-B618-97DBC4C20D6A}"/>
-              </a:ext>
-            </a:extLst>
-          </p:cNvPr>
-          <p:cNvSpPr>
-            <a:spLocks noGrp="1"/>
-          </p:cNvSpPr>
-          <p:nvPr>
-            <p:ph type="subTitle" idx="1"/>
-          </p:nvPr>
-        </p:nvSpPr>
-        <p:spPr>
-          <a:xfrm>
-            <a:off x="737936" y="1773238"/>
-            <a:ext cx="10857163" cy="4475162"/>
-          </a:xfrm>
-        </p:spPr>
-        <p:txBody>
-          <a:bodyPr>
-            <a:normAutofit/>
-          </a:bodyPr>
-          <a:lstStyle/>
-          <a:p>
-            <a:pPr marL="342900" indent="-342900" algn="l">
-              <a:buFont typeface="Arial" panose="020B0604020202020204" pitchFamily="34" charset="0"/>
-              <a:buChar char="•"/>
-            </a:pPr>
-            <a:r>
-              <a:rPr kumimoji="1" lang="en-US" altLang="ja-JP" sz="2800" dirty="0"/>
-              <a:t>GitHub</a:t>
-            </a:r>
-            <a:r>
-              <a:rPr kumimoji="1" lang="ja-JP" altLang="en-US" sz="2800" dirty="0"/>
-              <a:t>で開発を進めております</a:t>
-            </a:r>
-            <a:endParaRPr kumimoji="1" lang="en-US" altLang="ja-JP" sz="2800" dirty="0"/>
-          </a:p>
-          <a:p>
-            <a:pPr marL="342900" indent="-342900" algn="l">
-              <a:buFont typeface="Arial" panose="020B0604020202020204" pitchFamily="34" charset="0"/>
-              <a:buChar char="•"/>
-            </a:pPr>
-            <a:r>
-              <a:rPr lang="en-US" altLang="ja-JP" sz="2800" dirty="0"/>
-              <a:t>Web</a:t>
-            </a:r>
-            <a:r>
-              <a:rPr lang="ja-JP" altLang="en-US" sz="2800" dirty="0"/>
-              <a:t>サイトは動かせるようになっています</a:t>
-            </a:r>
-            <a:endParaRPr lang="en-US" altLang="ja-JP" sz="2800" dirty="0"/>
-          </a:p>
-          <a:p>
-            <a:pPr algn="l"/>
-            <a:endParaRPr lang="en-US" altLang="ja-JP" sz="2800" dirty="0"/>
-          </a:p>
-          <a:p>
-            <a:pPr algn="l"/>
-            <a:r>
-              <a:rPr kumimoji="1" lang="ja-JP" altLang="en-US" sz="2800" dirty="0"/>
-              <a:t>課題</a:t>
-            </a:r>
-            <a:endParaRPr kumimoji="1" lang="en-US" altLang="ja-JP" sz="2800" dirty="0"/>
-          </a:p>
-          <a:p>
-            <a:pPr marL="457200" indent="-457200" algn="l">
-              <a:buFont typeface="Arial" panose="020B0604020202020204" pitchFamily="34" charset="0"/>
-              <a:buChar char="•"/>
-            </a:pPr>
-            <a:r>
-              <a:rPr kumimoji="1" lang="ja-JP" altLang="en-US" sz="2800" dirty="0"/>
-              <a:t>学習モデル</a:t>
-            </a:r>
-            <a:endParaRPr kumimoji="1" lang="en-US" altLang="ja-JP" sz="2800" dirty="0"/>
-          </a:p>
-          <a:p>
-            <a:pPr marL="457200" indent="-457200" algn="l">
-              <a:buFont typeface="Arial" panose="020B0604020202020204" pitchFamily="34" charset="0"/>
-              <a:buChar char="•"/>
-            </a:pPr>
-            <a:r>
-              <a:rPr lang="ja-JP" altLang="en-US" sz="2800" dirty="0"/>
-              <a:t>音楽ファイルのやり取り</a:t>
-            </a:r>
-            <a:endParaRPr lang="en-US" altLang="ja-JP" sz="2800" dirty="0"/>
+            <a:r>
+              <a:rPr lang="en-US" altLang="ja-JP" dirty="0"/>
+              <a:t>RNN</a:t>
+            </a:r>
+            <a:r>
+              <a:rPr lang="ja-JP" altLang="en-US" dirty="0" err="1"/>
+              <a:t>だけ</a:t>
+            </a:r>
+            <a:r>
+              <a:rPr lang="ja-JP" altLang="en-US" dirty="0"/>
+              <a:t>ではデータが長くなりすぎて、予測に適した出力ができなくなってしまうので、忘却ゲートというデータを切り捨てて短くする計算を入力の前に挟むことで、適した出力ができるようにする。</a:t>
+            </a:r>
+            <a:endParaRPr lang="en-US" altLang="ja-JP" dirty="0"/>
           </a:p>
         </p:txBody>
       </p:sp>
     </p:spTree>
     <p:extLst>
       <p:ext uri="{BB962C8B-B14F-4D97-AF65-F5344CB8AC3E}">
-        <p14:creationId xmlns:p14="http://schemas.microsoft.com/office/powerpoint/2010/main" val="1360215977"/>
+        <p14:creationId xmlns:p14="http://schemas.microsoft.com/office/powerpoint/2010/main" val="1913493897"/>
       </p:ext>
     </p:extLst>
   </p:cSld>
   <p:clrMapOvr>
     <a:masterClrMapping/>
   </p:clrMapOvr>
-  <mc:AlternateContent xmlns:mc="http://schemas.openxmlformats.org/markup-compatibility/2006">
-    <mc:Choice xmlns:p14="http://schemas.microsoft.com/office/powerpoint/2010/main" Requires="p14">
+  <mc:AlternateContent xmlns:mc="http://schemas.openxmlformats.org/markup-compatibility/2006" xmlns:p14="http://schemas.microsoft.com/office/powerpoint/2010/main">
+    <mc:Choice Requires="p14">
       <p:transition spd="slow" p14:dur="800">
         <p:circle/>
       </p:transition>
     </mc:Choice>
-    <mc:Fallback>
+    <mc:Fallback xmlns="">
       <p:transition spd="slow">
         <p:circle/>
       </p:transition>
@@ -5068,6 +4970,198 @@
           <p:cNvPr id="2" name="タイトル 1">
             <a:extLst>
               <a:ext uri="{FF2B5EF4-FFF2-40B4-BE49-F238E27FC236}">
+                <a16:creationId xmlns:a16="http://schemas.microsoft.com/office/drawing/2014/main" id="{99218024-A4EE-4EEA-8916-177105FDF5DB}"/>
+              </a:ext>
+            </a:extLst>
+          </p:cNvPr>
+          <p:cNvSpPr>
+            <a:spLocks noGrp="1"/>
+          </p:cNvSpPr>
+          <p:nvPr>
+            <p:ph type="ctrTitle"/>
+          </p:nvPr>
+        </p:nvSpPr>
+        <p:spPr>
+          <a:xfrm>
+            <a:off x="228600" y="152400"/>
+            <a:ext cx="9144000" cy="1892300"/>
+          </a:xfrm>
+        </p:spPr>
+        <p:txBody>
+          <a:bodyPr/>
+          <a:lstStyle/>
+          <a:p>
+            <a:pPr algn="l"/>
+            <a:r>
+              <a:rPr lang="ja-JP" altLang="en-US" b="1" dirty="0"/>
+              <a:t>現在の進捗状況</a:t>
+            </a:r>
+            <a:br>
+              <a:rPr lang="ja-JP" altLang="en-US" b="1" dirty="0"/>
+            </a:br>
+            <a:endParaRPr kumimoji="1" lang="ja-JP" altLang="en-US" dirty="0"/>
+          </a:p>
+        </p:txBody>
+      </p:sp>
+      <p:sp>
+        <p:nvSpPr>
+          <p:cNvPr id="3" name="字幕 2">
+            <a:extLst>
+              <a:ext uri="{FF2B5EF4-FFF2-40B4-BE49-F238E27FC236}">
+                <a16:creationId xmlns:a16="http://schemas.microsoft.com/office/drawing/2014/main" id="{A731940E-22B5-4EFD-B618-97DBC4C20D6A}"/>
+              </a:ext>
+            </a:extLst>
+          </p:cNvPr>
+          <p:cNvSpPr>
+            <a:spLocks noGrp="1"/>
+          </p:cNvSpPr>
+          <p:nvPr>
+            <p:ph type="subTitle" idx="1"/>
+          </p:nvPr>
+        </p:nvSpPr>
+        <p:spPr>
+          <a:xfrm>
+            <a:off x="737936" y="1773238"/>
+            <a:ext cx="10857163" cy="4475162"/>
+          </a:xfrm>
+        </p:spPr>
+        <p:txBody>
+          <a:bodyPr>
+            <a:normAutofit/>
+          </a:bodyPr>
+          <a:lstStyle/>
+          <a:p>
+            <a:pPr marL="342900" indent="-342900" algn="l">
+              <a:buFont typeface="Arial" panose="020B0604020202020204" pitchFamily="34" charset="0"/>
+              <a:buChar char="•"/>
+            </a:pPr>
+            <a:r>
+              <a:rPr kumimoji="1" lang="en-US" altLang="ja-JP" sz="2800" dirty="0"/>
+              <a:t>GitHub</a:t>
+            </a:r>
+            <a:r>
+              <a:rPr lang="ja-JP" altLang="en-US" sz="2800" dirty="0"/>
+              <a:t>を使って</a:t>
+            </a:r>
+            <a:r>
+              <a:rPr kumimoji="1" lang="ja-JP" altLang="en-US" sz="2800" dirty="0"/>
+              <a:t>開発を進めております</a:t>
+            </a:r>
+            <a:endParaRPr kumimoji="1" lang="en-US" altLang="ja-JP" sz="2800" dirty="0"/>
+          </a:p>
+          <a:p>
+            <a:pPr marL="342900" indent="-342900" algn="l">
+              <a:buFont typeface="Arial" panose="020B0604020202020204" pitchFamily="34" charset="0"/>
+              <a:buChar char="•"/>
+            </a:pPr>
+            <a:r>
+              <a:rPr lang="en-US" altLang="ja-JP" sz="2800" dirty="0"/>
+              <a:t>Web</a:t>
+            </a:r>
+            <a:r>
+              <a:rPr lang="ja-JP" altLang="en-US" sz="2800" dirty="0"/>
+              <a:t>サイトは動かせるようになっています</a:t>
+            </a:r>
+            <a:endParaRPr lang="en-US" altLang="ja-JP" sz="2800" dirty="0"/>
+          </a:p>
+          <a:p>
+            <a:pPr algn="l"/>
+            <a:endParaRPr lang="en-US" altLang="ja-JP" sz="2800" dirty="0"/>
+          </a:p>
+          <a:p>
+            <a:pPr algn="l"/>
+            <a:r>
+              <a:rPr kumimoji="1" lang="ja-JP" altLang="en-US" sz="2800" dirty="0"/>
+              <a:t>課題</a:t>
+            </a:r>
+            <a:endParaRPr kumimoji="1" lang="en-US" altLang="ja-JP" sz="2800" dirty="0"/>
+          </a:p>
+          <a:p>
+            <a:pPr marL="457200" indent="-457200" algn="l">
+              <a:buFont typeface="Arial" panose="020B0604020202020204" pitchFamily="34" charset="0"/>
+              <a:buChar char="•"/>
+            </a:pPr>
+            <a:r>
+              <a:rPr kumimoji="1" lang="ja-JP" altLang="en-US" sz="2800" dirty="0"/>
+              <a:t>学習モデル</a:t>
+            </a:r>
+            <a:endParaRPr kumimoji="1" lang="en-US" altLang="ja-JP" sz="2800" dirty="0"/>
+          </a:p>
+          <a:p>
+            <a:pPr marL="457200" indent="-457200" algn="l">
+              <a:buFont typeface="Arial" panose="020B0604020202020204" pitchFamily="34" charset="0"/>
+              <a:buChar char="•"/>
+            </a:pPr>
+            <a:r>
+              <a:rPr lang="ja-JP" altLang="en-US" sz="2800" dirty="0"/>
+              <a:t>音楽ファイルのやり取り</a:t>
+            </a:r>
+            <a:endParaRPr lang="en-US" altLang="ja-JP" sz="2800" dirty="0"/>
+          </a:p>
+          <a:p>
+            <a:pPr marL="457200" indent="-457200" algn="l">
+              <a:buFont typeface="Arial" panose="020B0604020202020204" pitchFamily="34" charset="0"/>
+              <a:buChar char="•"/>
+            </a:pPr>
+            <a:r>
+              <a:rPr lang="en-US" altLang="ja-JP" sz="2800" dirty="0"/>
+              <a:t>Web</a:t>
+            </a:r>
+            <a:r>
+              <a:rPr lang="ja-JP" altLang="en-US" sz="2800" dirty="0"/>
+              <a:t>ページの改良</a:t>
+            </a:r>
+            <a:endParaRPr lang="en-US" altLang="ja-JP" sz="2800" dirty="0"/>
+          </a:p>
+        </p:txBody>
+      </p:sp>
+    </p:spTree>
+    <p:extLst>
+      <p:ext uri="{BB962C8B-B14F-4D97-AF65-F5344CB8AC3E}">
+        <p14:creationId xmlns:p14="http://schemas.microsoft.com/office/powerpoint/2010/main" val="1360215977"/>
+      </p:ext>
+    </p:extLst>
+  </p:cSld>
+  <p:clrMapOvr>
+    <a:masterClrMapping/>
+  </p:clrMapOvr>
+  <mc:AlternateContent xmlns:mc="http://schemas.openxmlformats.org/markup-compatibility/2006" xmlns:p14="http://schemas.microsoft.com/office/powerpoint/2010/main">
+    <mc:Choice Requires="p14">
+      <p:transition spd="slow" p14:dur="800">
+        <p:circle/>
+      </p:transition>
+    </mc:Choice>
+    <mc:Fallback xmlns="">
+      <p:transition spd="slow">
+        <p:circle/>
+      </p:transition>
+    </mc:Fallback>
+  </mc:AlternateContent>
+</p:sld>
+</file>
+
+<file path=ppt/slides/slide13.xml><?xml version="1.0" encoding="utf-8"?>
+<p:sld xmlns:a="http://schemas.openxmlformats.org/drawingml/2006/main" xmlns:r="http://schemas.openxmlformats.org/officeDocument/2006/relationships" xmlns:p="http://schemas.openxmlformats.org/presentationml/2006/main">
+  <p:cSld>
+    <p:spTree>
+      <p:nvGrpSpPr>
+        <p:cNvPr id="1" name=""/>
+        <p:cNvGrpSpPr/>
+        <p:nvPr/>
+      </p:nvGrpSpPr>
+      <p:grpSpPr>
+        <a:xfrm>
+          <a:off x="0" y="0"/>
+          <a:ext cx="0" cy="0"/>
+          <a:chOff x="0" y="0"/>
+          <a:chExt cx="0" cy="0"/>
+        </a:xfrm>
+      </p:grpSpPr>
+      <p:sp>
+        <p:nvSpPr>
+          <p:cNvPr id="2" name="タイトル 1">
+            <a:extLst>
+              <a:ext uri="{FF2B5EF4-FFF2-40B4-BE49-F238E27FC236}">
                 <a16:creationId xmlns:a16="http://schemas.microsoft.com/office/drawing/2014/main" id="{6A02AA03-3DED-4449-8542-51D6A9F1532E}"/>
               </a:ext>
             </a:extLst>
@@ -5110,13 +5204,13 @@
   <p:clrMapOvr>
     <a:masterClrMapping/>
   </p:clrMapOvr>
-  <mc:AlternateContent xmlns:mc="http://schemas.openxmlformats.org/markup-compatibility/2006">
-    <mc:Choice xmlns:p14="http://schemas.microsoft.com/office/powerpoint/2010/main" Requires="p14">
+  <mc:AlternateContent xmlns:mc="http://schemas.openxmlformats.org/markup-compatibility/2006" xmlns:p14="http://schemas.microsoft.com/office/powerpoint/2010/main">
+    <mc:Choice Requires="p14">
       <p:transition spd="slow" p14:dur="800">
         <p:circle/>
       </p:transition>
     </mc:Choice>
-    <mc:Fallback>
+    <mc:Fallback xmlns="">
       <p:transition spd="slow">
         <p:circle/>
       </p:transition>
@@ -5300,13 +5394,13 @@
   <p:clrMapOvr>
     <a:masterClrMapping/>
   </p:clrMapOvr>
-  <mc:AlternateContent xmlns:mc="http://schemas.openxmlformats.org/markup-compatibility/2006">
-    <mc:Choice xmlns:p14="http://schemas.microsoft.com/office/powerpoint/2010/main" Requires="p14">
+  <mc:AlternateContent xmlns:mc="http://schemas.openxmlformats.org/markup-compatibility/2006" xmlns:p14="http://schemas.microsoft.com/office/powerpoint/2010/main">
+    <mc:Choice Requires="p14">
       <p:transition spd="slow" p14:dur="800">
         <p:circle/>
       </p:transition>
     </mc:Choice>
-    <mc:Fallback>
+    <mc:Fallback xmlns="">
       <p:transition spd="slow">
         <p:circle/>
       </p:transition>
@@ -5367,12 +5461,97 @@
           </a:p>
         </p:txBody>
       </p:sp>
-      <p:sp>
-        <p:nvSpPr>
-          <p:cNvPr id="5" name="テキスト ボックス 4">
-            <a:extLst>
-              <a:ext uri="{FF2B5EF4-FFF2-40B4-BE49-F238E27FC236}">
-                <a16:creationId xmlns:a16="http://schemas.microsoft.com/office/drawing/2014/main" id="{843B0245-9A3B-4E97-B4FC-2A4D8CA8C5A5}"/>
+      <p:pic>
+        <p:nvPicPr>
+          <p:cNvPr id="8" name="図 7">
+            <a:extLst>
+              <a:ext uri="{FF2B5EF4-FFF2-40B4-BE49-F238E27FC236}">
+                <a16:creationId xmlns:a16="http://schemas.microsoft.com/office/drawing/2014/main" id="{7ECD8D03-A540-4384-92DB-DC4154AD12EB}"/>
+              </a:ext>
+            </a:extLst>
+          </p:cNvPr>
+          <p:cNvPicPr>
+            <a:picLocks noChangeAspect="1"/>
+          </p:cNvPicPr>
+          <p:nvPr/>
+        </p:nvPicPr>
+        <p:blipFill>
+          <a:blip r:embed="rId3">
+            <a:extLst>
+              <a:ext uri="{28A0092B-C50C-407E-A947-70E740481C1C}">
+                <a14:useLocalDpi xmlns:a14="http://schemas.microsoft.com/office/drawing/2010/main" val="0"/>
+              </a:ext>
+            </a:extLst>
+          </a:blip>
+          <a:stretch>
+            <a:fillRect/>
+          </a:stretch>
+        </p:blipFill>
+        <p:spPr>
+          <a:xfrm>
+            <a:off x="873933" y="1954361"/>
+            <a:ext cx="1718456" cy="1293028"/>
+          </a:xfrm>
+          <a:prstGeom prst="rect">
+            <a:avLst/>
+          </a:prstGeom>
+        </p:spPr>
+      </p:pic>
+      <p:sp>
+        <p:nvSpPr>
+          <p:cNvPr id="9" name="矢印: 右 8">
+            <a:extLst>
+              <a:ext uri="{FF2B5EF4-FFF2-40B4-BE49-F238E27FC236}">
+                <a16:creationId xmlns:a16="http://schemas.microsoft.com/office/drawing/2014/main" id="{22232900-CF15-42ED-B61D-004E36DA459A}"/>
+              </a:ext>
+            </a:extLst>
+          </p:cNvPr>
+          <p:cNvSpPr/>
+          <p:nvPr/>
+        </p:nvSpPr>
+        <p:spPr>
+          <a:xfrm>
+            <a:off x="3144254" y="2318133"/>
+            <a:ext cx="930442" cy="565484"/>
+          </a:xfrm>
+          <a:prstGeom prst="rightArrow">
+            <a:avLst/>
+          </a:prstGeom>
+          <a:solidFill>
+            <a:srgbClr val="00B050"/>
+          </a:solidFill>
+        </p:spPr>
+        <p:style>
+          <a:lnRef idx="2">
+            <a:schemeClr val="accent1">
+              <a:shade val="50000"/>
+            </a:schemeClr>
+          </a:lnRef>
+          <a:fillRef idx="1">
+            <a:schemeClr val="accent1"/>
+          </a:fillRef>
+          <a:effectRef idx="0">
+            <a:schemeClr val="accent1"/>
+          </a:effectRef>
+          <a:fontRef idx="minor">
+            <a:schemeClr val="lt1"/>
+          </a:fontRef>
+        </p:style>
+        <p:txBody>
+          <a:bodyPr rtlCol="0" anchor="ctr"/>
+          <a:lstStyle/>
+          <a:p>
+            <a:pPr algn="ctr"/>
+            <a:endParaRPr kumimoji="1" lang="ja-JP" altLang="en-US"/>
+          </a:p>
+        </p:txBody>
+      </p:sp>
+      <p:sp>
+        <p:nvSpPr>
+          <p:cNvPr id="13" name="テキスト ボックス 12">
+            <a:extLst>
+              <a:ext uri="{FF2B5EF4-FFF2-40B4-BE49-F238E27FC236}">
+                <a16:creationId xmlns:a16="http://schemas.microsoft.com/office/drawing/2014/main" id="{D2EC5B4D-3CEA-45D4-8A0C-A52B40544298}"/>
               </a:ext>
             </a:extLst>
           </p:cNvPr>
@@ -5381,8 +5560,8 @@
         </p:nvSpPr>
         <p:spPr>
           <a:xfrm>
-            <a:off x="977900" y="1471615"/>
-            <a:ext cx="10236200" cy="1938992"/>
+            <a:off x="8843391" y="3429000"/>
+            <a:ext cx="2294021" cy="621341"/>
           </a:xfrm>
           <a:prstGeom prst="rect">
             <a:avLst/>
@@ -5395,83 +5574,620 @@
           </a:bodyPr>
           <a:lstStyle/>
           <a:p>
-            <a:pPr marL="285750" indent="-285750">
-              <a:buFont typeface="Arial" panose="020B0604020202020204" pitchFamily="34" charset="0"/>
-              <a:buChar char="•"/>
-            </a:pPr>
-            <a:r>
-              <a:rPr lang="en-US" altLang="ja-JP" sz="2400" dirty="0"/>
-              <a:t>Web</a:t>
-            </a:r>
-            <a:r>
-              <a:rPr lang="ja-JP" altLang="en-US" sz="2400" dirty="0"/>
-              <a:t>アプリケーションなのでサーバに自動作曲システムがある</a:t>
-            </a:r>
-            <a:endParaRPr lang="en-US" altLang="ja-JP" sz="2400" dirty="0"/>
-          </a:p>
-          <a:p>
-            <a:pPr marL="285750" indent="-285750">
-              <a:buFont typeface="Arial" panose="020B0604020202020204" pitchFamily="34" charset="0"/>
-              <a:buChar char="•"/>
-            </a:pPr>
-            <a:endParaRPr lang="en-US" altLang="ja-JP" sz="2400" dirty="0"/>
-          </a:p>
-          <a:p>
-            <a:pPr marL="285750" indent="-285750">
-              <a:buFont typeface="Arial" panose="020B0604020202020204" pitchFamily="34" charset="0"/>
-              <a:buChar char="•"/>
-            </a:pPr>
-            <a:r>
-              <a:rPr lang="ja-JP" altLang="en-US" sz="2400" dirty="0"/>
-              <a:t>自動作曲システムは</a:t>
-            </a:r>
-            <a:r>
-              <a:rPr lang="en-US" altLang="ja-JP" sz="2400" dirty="0"/>
-              <a:t>Python</a:t>
-            </a:r>
-            <a:r>
-              <a:rPr lang="ja-JP" altLang="en-US" sz="2400" dirty="0"/>
-              <a:t>で実装</a:t>
-            </a:r>
-            <a:endParaRPr lang="en-US" altLang="ja-JP" sz="2400" dirty="0"/>
-          </a:p>
-          <a:p>
-            <a:pPr marL="285750" indent="-285750">
-              <a:buFont typeface="Arial" panose="020B0604020202020204" pitchFamily="34" charset="0"/>
-              <a:buChar char="•"/>
-            </a:pPr>
-            <a:endParaRPr lang="en-US" altLang="ja-JP" sz="2400" dirty="0"/>
-          </a:p>
-          <a:p>
-            <a:pPr marL="285750" indent="-285750">
-              <a:buFont typeface="Arial" panose="020B0604020202020204" pitchFamily="34" charset="0"/>
-              <a:buChar char="•"/>
-            </a:pPr>
-            <a:r>
-              <a:rPr lang="ja-JP" altLang="en-US" sz="2400" dirty="0"/>
-              <a:t>サーバのプログラムは</a:t>
-            </a:r>
-            <a:r>
-              <a:rPr kumimoji="1" lang="en-US" altLang="ja-JP" sz="2400" dirty="0"/>
+            <a:endParaRPr kumimoji="1" lang="ja-JP" altLang="en-US" dirty="0"/>
+          </a:p>
+        </p:txBody>
+      </p:sp>
+      <p:pic>
+        <p:nvPicPr>
+          <p:cNvPr id="17" name="図 16">
+            <a:extLst>
+              <a:ext uri="{FF2B5EF4-FFF2-40B4-BE49-F238E27FC236}">
+                <a16:creationId xmlns:a16="http://schemas.microsoft.com/office/drawing/2014/main" id="{F635ED6F-6CE3-4C81-B91F-622759D54AF4}"/>
+              </a:ext>
+            </a:extLst>
+          </p:cNvPr>
+          <p:cNvPicPr>
+            <a:picLocks noChangeAspect="1"/>
+          </p:cNvPicPr>
+          <p:nvPr/>
+        </p:nvPicPr>
+        <p:blipFill>
+          <a:blip r:embed="rId4">
+            <a:extLst>
+              <a:ext uri="{28A0092B-C50C-407E-A947-70E740481C1C}">
+                <a14:useLocalDpi xmlns:a14="http://schemas.microsoft.com/office/drawing/2010/main" val="0"/>
+              </a:ext>
+            </a:extLst>
+          </a:blip>
+          <a:stretch>
+            <a:fillRect/>
+          </a:stretch>
+        </p:blipFill>
+        <p:spPr>
+          <a:xfrm>
+            <a:off x="4216978" y="1954361"/>
+            <a:ext cx="1167864" cy="1167864"/>
+          </a:xfrm>
+          <a:prstGeom prst="rect">
+            <a:avLst/>
+          </a:prstGeom>
+        </p:spPr>
+      </p:pic>
+      <p:cxnSp>
+        <p:nvCxnSpPr>
+          <p:cNvPr id="19" name="直線コネクタ 18">
+            <a:extLst>
+              <a:ext uri="{FF2B5EF4-FFF2-40B4-BE49-F238E27FC236}">
+                <a16:creationId xmlns:a16="http://schemas.microsoft.com/office/drawing/2014/main" id="{A0D37746-D309-40AE-A0C0-3A39F14887DA}"/>
+              </a:ext>
+            </a:extLst>
+          </p:cNvPr>
+          <p:cNvCxnSpPr>
+            <a:cxnSpLocks/>
+            <a:stCxn id="17" idx="3"/>
+          </p:cNvCxnSpPr>
+          <p:nvPr/>
+        </p:nvCxnSpPr>
+        <p:spPr>
+          <a:xfrm>
+            <a:off x="5384842" y="2538293"/>
+            <a:ext cx="546907" cy="0"/>
+          </a:xfrm>
+          <a:prstGeom prst="line">
+            <a:avLst/>
+          </a:prstGeom>
+        </p:spPr>
+        <p:style>
+          <a:lnRef idx="1">
+            <a:schemeClr val="accent6"/>
+          </a:lnRef>
+          <a:fillRef idx="0">
+            <a:schemeClr val="accent6"/>
+          </a:fillRef>
+          <a:effectRef idx="0">
+            <a:schemeClr val="accent6"/>
+          </a:effectRef>
+          <a:fontRef idx="minor">
+            <a:schemeClr val="tx1"/>
+          </a:fontRef>
+        </p:style>
+      </p:cxnSp>
+      <p:sp>
+        <p:nvSpPr>
+          <p:cNvPr id="20" name="テキスト ボックス 19">
+            <a:extLst>
+              <a:ext uri="{FF2B5EF4-FFF2-40B4-BE49-F238E27FC236}">
+                <a16:creationId xmlns:a16="http://schemas.microsoft.com/office/drawing/2014/main" id="{EE46EACE-71CE-49D5-8C38-4DEC4EDA1C9E}"/>
+              </a:ext>
+            </a:extLst>
+          </p:cNvPr>
+          <p:cNvSpPr txBox="1"/>
+          <p:nvPr/>
+        </p:nvSpPr>
+        <p:spPr>
+          <a:xfrm>
+            <a:off x="873933" y="3555004"/>
+            <a:ext cx="1718456" cy="369332"/>
+          </a:xfrm>
+          <a:prstGeom prst="rect">
+            <a:avLst/>
+          </a:prstGeom>
+          <a:noFill/>
+        </p:spPr>
+        <p:txBody>
+          <a:bodyPr wrap="square" rtlCol="0">
+            <a:spAutoFit/>
+          </a:bodyPr>
+          <a:lstStyle/>
+          <a:p>
+            <a:pPr algn="ctr"/>
+            <a:r>
+              <a:rPr kumimoji="1" lang="ja-JP" altLang="en-US" dirty="0"/>
+              <a:t>ユーザ</a:t>
+            </a:r>
+          </a:p>
+        </p:txBody>
+      </p:sp>
+      <p:grpSp>
+        <p:nvGrpSpPr>
+          <p:cNvPr id="23" name="グループ化 22">
+            <a:extLst>
+              <a:ext uri="{FF2B5EF4-FFF2-40B4-BE49-F238E27FC236}">
+                <a16:creationId xmlns:a16="http://schemas.microsoft.com/office/drawing/2014/main" id="{413CACD0-2EF9-40DA-A533-DF471D753942}"/>
+              </a:ext>
+            </a:extLst>
+          </p:cNvPr>
+          <p:cNvGrpSpPr/>
+          <p:nvPr/>
+        </p:nvGrpSpPr>
+        <p:grpSpPr>
+          <a:xfrm>
+            <a:off x="5931748" y="1914304"/>
+            <a:ext cx="5823283" cy="4620397"/>
+            <a:chOff x="5968773" y="1443511"/>
+            <a:chExt cx="5823283" cy="4620397"/>
+          </a:xfrm>
+        </p:grpSpPr>
+        <p:sp>
+          <p:nvSpPr>
+            <p:cNvPr id="10" name="四角形: 角を丸くする 9">
+              <a:extLst>
+                <a:ext uri="{FF2B5EF4-FFF2-40B4-BE49-F238E27FC236}">
+                  <a16:creationId xmlns:a16="http://schemas.microsoft.com/office/drawing/2014/main" id="{0409614C-F3D0-40A0-86DF-1580DDD8E79B}"/>
+                </a:ext>
+              </a:extLst>
+            </p:cNvPr>
+            <p:cNvSpPr/>
+            <p:nvPr/>
+          </p:nvSpPr>
+          <p:spPr>
+            <a:xfrm>
+              <a:off x="5968773" y="1443511"/>
+              <a:ext cx="5823283" cy="4620397"/>
+            </a:xfrm>
+            <a:prstGeom prst="roundRect">
+              <a:avLst/>
+            </a:prstGeom>
+          </p:spPr>
+          <p:style>
+            <a:lnRef idx="2">
+              <a:schemeClr val="accent6"/>
+            </a:lnRef>
+            <a:fillRef idx="1">
+              <a:schemeClr val="lt1"/>
+            </a:fillRef>
+            <a:effectRef idx="0">
+              <a:schemeClr val="accent6"/>
+            </a:effectRef>
+            <a:fontRef idx="minor">
+              <a:schemeClr val="dk1"/>
+            </a:fontRef>
+          </p:style>
+          <p:txBody>
+            <a:bodyPr rtlCol="0" anchor="ctr"/>
+            <a:lstStyle/>
+            <a:p>
+              <a:pPr algn="ctr"/>
+              <a:endParaRPr kumimoji="1" lang="ja-JP" altLang="en-US"/>
+            </a:p>
+          </p:txBody>
+        </p:sp>
+        <p:grpSp>
+          <p:nvGrpSpPr>
+            <p:cNvPr id="15" name="グループ化 14">
+              <a:extLst>
+                <a:ext uri="{FF2B5EF4-FFF2-40B4-BE49-F238E27FC236}">
+                  <a16:creationId xmlns:a16="http://schemas.microsoft.com/office/drawing/2014/main" id="{B130732D-09B9-4E65-ADEE-5983671C3596}"/>
+                </a:ext>
+              </a:extLst>
+            </p:cNvPr>
+            <p:cNvGrpSpPr/>
+            <p:nvPr/>
+          </p:nvGrpSpPr>
+          <p:grpSpPr>
+            <a:xfrm>
+              <a:off x="8889566" y="1852717"/>
+              <a:ext cx="2655330" cy="1860539"/>
+              <a:chOff x="8662737" y="2189802"/>
+              <a:chExt cx="2655330" cy="1860539"/>
+            </a:xfrm>
+          </p:grpSpPr>
+          <p:sp>
+            <p:nvSpPr>
+              <p:cNvPr id="11" name="四角形: 角を丸くする 10">
+                <a:extLst>
+                  <a:ext uri="{FF2B5EF4-FFF2-40B4-BE49-F238E27FC236}">
+                    <a16:creationId xmlns:a16="http://schemas.microsoft.com/office/drawing/2014/main" id="{93A19059-D052-447A-924F-5E9291ABD726}"/>
+                  </a:ext>
+                </a:extLst>
+              </p:cNvPr>
+              <p:cNvSpPr/>
+              <p:nvPr/>
+            </p:nvSpPr>
+            <p:spPr>
+              <a:xfrm>
+                <a:off x="8662737" y="2189802"/>
+                <a:ext cx="2655330" cy="1860539"/>
+              </a:xfrm>
+              <a:prstGeom prst="roundRect">
+                <a:avLst/>
+              </a:prstGeom>
+              <a:solidFill>
+                <a:schemeClr val="accent2"/>
+              </a:solidFill>
+            </p:spPr>
+            <p:style>
+              <a:lnRef idx="2">
+                <a:schemeClr val="accent1">
+                  <a:shade val="50000"/>
+                </a:schemeClr>
+              </a:lnRef>
+              <a:fillRef idx="1">
+                <a:schemeClr val="accent1"/>
+              </a:fillRef>
+              <a:effectRef idx="0">
+                <a:schemeClr val="accent1"/>
+              </a:effectRef>
+              <a:fontRef idx="minor">
+                <a:schemeClr val="lt1"/>
+              </a:fontRef>
+            </p:style>
+            <p:txBody>
+              <a:bodyPr rtlCol="0" anchor="ctr"/>
+              <a:lstStyle/>
+              <a:p>
+                <a:pPr algn="ctr"/>
+                <a:endParaRPr kumimoji="1" lang="en-US" altLang="ja-JP" dirty="0"/>
+              </a:p>
+            </p:txBody>
+          </p:sp>
+          <p:sp>
+            <p:nvSpPr>
+              <p:cNvPr id="12" name="テキスト ボックス 11">
+                <a:extLst>
+                  <a:ext uri="{FF2B5EF4-FFF2-40B4-BE49-F238E27FC236}">
+                    <a16:creationId xmlns:a16="http://schemas.microsoft.com/office/drawing/2014/main" id="{D0E94323-8F75-4A70-A78E-EEA688500E66}"/>
+                  </a:ext>
+                </a:extLst>
+              </p:cNvPr>
+              <p:cNvSpPr txBox="1"/>
+              <p:nvPr/>
+            </p:nvSpPr>
+            <p:spPr>
+              <a:xfrm>
+                <a:off x="8843391" y="2562052"/>
+                <a:ext cx="2294021" cy="369332"/>
+              </a:xfrm>
+              <a:prstGeom prst="rect">
+                <a:avLst/>
+              </a:prstGeom>
+              <a:noFill/>
+            </p:spPr>
+            <p:txBody>
+              <a:bodyPr wrap="square" rtlCol="0">
+                <a:spAutoFit/>
+              </a:bodyPr>
+              <a:lstStyle/>
+              <a:p>
+                <a:r>
+                  <a:rPr kumimoji="1" lang="ja-JP" altLang="en-US" b="1" dirty="0">
+                    <a:solidFill>
+                      <a:schemeClr val="bg1"/>
+                    </a:solidFill>
+                  </a:rPr>
+                  <a:t>自動作曲</a:t>
+                </a:r>
+                <a:r>
+                  <a:rPr lang="ja-JP" altLang="en-US" b="1" dirty="0">
+                    <a:solidFill>
+                      <a:schemeClr val="bg1"/>
+                    </a:solidFill>
+                  </a:rPr>
+                  <a:t>システム</a:t>
+                </a:r>
+                <a:endParaRPr kumimoji="1" lang="ja-JP" altLang="en-US" b="1" dirty="0">
+                  <a:solidFill>
+                    <a:schemeClr val="bg1"/>
+                  </a:solidFill>
+                </a:endParaRPr>
+              </a:p>
+            </p:txBody>
+          </p:sp>
+          <p:sp>
+            <p:nvSpPr>
+              <p:cNvPr id="14" name="テキスト ボックス 13">
+                <a:extLst>
+                  <a:ext uri="{FF2B5EF4-FFF2-40B4-BE49-F238E27FC236}">
+                    <a16:creationId xmlns:a16="http://schemas.microsoft.com/office/drawing/2014/main" id="{50709B28-BB3F-4A94-BF79-DC5A4E45E897}"/>
+                  </a:ext>
+                </a:extLst>
+              </p:cNvPr>
+              <p:cNvSpPr txBox="1"/>
+              <p:nvPr/>
+            </p:nvSpPr>
+            <p:spPr>
+              <a:xfrm>
+                <a:off x="8853752" y="2966019"/>
+                <a:ext cx="2294021" cy="738664"/>
+              </a:xfrm>
+              <a:prstGeom prst="rect">
+                <a:avLst/>
+              </a:prstGeom>
+              <a:noFill/>
+            </p:spPr>
+            <p:txBody>
+              <a:bodyPr wrap="square" rtlCol="0">
+                <a:spAutoFit/>
+              </a:bodyPr>
+              <a:lstStyle/>
+              <a:p>
+                <a:r>
+                  <a:rPr kumimoji="1" lang="ja-JP" altLang="en-US" sz="2400" dirty="0">
+                    <a:solidFill>
+                      <a:schemeClr val="bg1"/>
+                    </a:solidFill>
+                  </a:rPr>
+                  <a:t>・</a:t>
+                </a:r>
+                <a:r>
+                  <a:rPr lang="en-US" altLang="ja-JP" sz="2000" dirty="0">
+                    <a:solidFill>
+                      <a:schemeClr val="bg1"/>
+                    </a:solidFill>
+                  </a:rPr>
+                  <a:t>DNN</a:t>
+                </a:r>
+              </a:p>
+              <a:p>
+                <a:pPr marL="742950" lvl="1" indent="-285750">
+                  <a:buFont typeface="Arial" panose="020B0604020202020204" pitchFamily="34" charset="0"/>
+                  <a:buChar char="•"/>
+                </a:pPr>
+                <a:r>
+                  <a:rPr lang="en-US" altLang="ja-JP" dirty="0">
+                    <a:solidFill>
+                      <a:schemeClr val="bg1"/>
+                    </a:solidFill>
+                  </a:rPr>
+                  <a:t>LSTM</a:t>
+                </a:r>
+              </a:p>
+            </p:txBody>
+          </p:sp>
+        </p:grpSp>
+        <p:sp>
+          <p:nvSpPr>
+            <p:cNvPr id="21" name="四角形: 角を丸くする 20">
+              <a:extLst>
+                <a:ext uri="{FF2B5EF4-FFF2-40B4-BE49-F238E27FC236}">
+                  <a16:creationId xmlns:a16="http://schemas.microsoft.com/office/drawing/2014/main" id="{C29707AB-F090-4A48-B64A-2FF4BBC21EE0}"/>
+                </a:ext>
+              </a:extLst>
+            </p:cNvPr>
+            <p:cNvSpPr/>
+            <p:nvPr/>
+          </p:nvSpPr>
+          <p:spPr>
+            <a:xfrm>
+              <a:off x="6114693" y="1852716"/>
+              <a:ext cx="2599949" cy="2400892"/>
+            </a:xfrm>
+            <a:prstGeom prst="roundRect">
+              <a:avLst/>
+            </a:prstGeom>
+          </p:spPr>
+          <p:style>
+            <a:lnRef idx="2">
+              <a:schemeClr val="accent5">
+                <a:shade val="50000"/>
+              </a:schemeClr>
+            </a:lnRef>
+            <a:fillRef idx="1">
+              <a:schemeClr val="accent5"/>
+            </a:fillRef>
+            <a:effectRef idx="0">
+              <a:schemeClr val="accent5"/>
+            </a:effectRef>
+            <a:fontRef idx="minor">
+              <a:schemeClr val="lt1"/>
+            </a:fontRef>
+          </p:style>
+          <p:txBody>
+            <a:bodyPr rtlCol="0" anchor="ctr"/>
+            <a:lstStyle/>
+            <a:p>
+              <a:pPr algn="ctr"/>
+              <a:endParaRPr kumimoji="1" lang="en-US" altLang="ja-JP" b="1" dirty="0"/>
+            </a:p>
+            <a:p>
+              <a:pPr algn="ctr"/>
+              <a:r>
+                <a:rPr kumimoji="1" lang="en-US" altLang="ja-JP" b="1" dirty="0"/>
+                <a:t>Web</a:t>
+              </a:r>
+              <a:r>
+                <a:rPr kumimoji="1" lang="ja-JP" altLang="en-US" b="1" dirty="0"/>
+                <a:t>ページ</a:t>
+              </a:r>
+              <a:endParaRPr lang="en-US" altLang="ja-JP" b="1" dirty="0"/>
+            </a:p>
+            <a:p>
+              <a:pPr algn="ctr"/>
+              <a:endParaRPr lang="en-US" altLang="ja-JP" dirty="0"/>
+            </a:p>
+            <a:p>
+              <a:pPr marL="285750" indent="-285750">
+                <a:buFont typeface="Arial" panose="020B0604020202020204" pitchFamily="34" charset="0"/>
+                <a:buChar char="•"/>
+              </a:pPr>
+              <a:r>
+                <a:rPr kumimoji="1" lang="ja-JP" altLang="en-US" dirty="0"/>
+                <a:t>タイトル</a:t>
+              </a:r>
+              <a:endParaRPr kumimoji="1" lang="en-US" altLang="ja-JP" dirty="0"/>
+            </a:p>
+            <a:p>
+              <a:pPr marL="285750" indent="-285750">
+                <a:buFont typeface="Arial" panose="020B0604020202020204" pitchFamily="34" charset="0"/>
+                <a:buChar char="•"/>
+              </a:pPr>
+              <a:endParaRPr kumimoji="1" lang="en-US" altLang="ja-JP" dirty="0"/>
+            </a:p>
+            <a:p>
+              <a:pPr marL="285750" indent="-285750">
+                <a:buFont typeface="Arial" panose="020B0604020202020204" pitchFamily="34" charset="0"/>
+                <a:buChar char="•"/>
+              </a:pPr>
+              <a:r>
+                <a:rPr lang="ja-JP" altLang="en-US" dirty="0"/>
+                <a:t>入力画面</a:t>
+              </a:r>
+              <a:endParaRPr lang="en-US" altLang="ja-JP" dirty="0"/>
+            </a:p>
+            <a:p>
+              <a:pPr marL="285750" indent="-285750">
+                <a:buFont typeface="Arial" panose="020B0604020202020204" pitchFamily="34" charset="0"/>
+                <a:buChar char="•"/>
+              </a:pPr>
+              <a:endParaRPr lang="en-US" altLang="ja-JP" dirty="0"/>
+            </a:p>
+            <a:p>
+              <a:pPr marL="285750" indent="-285750">
+                <a:buFont typeface="Arial" panose="020B0604020202020204" pitchFamily="34" charset="0"/>
+                <a:buChar char="•"/>
+              </a:pPr>
+              <a:r>
+                <a:rPr kumimoji="1" lang="ja-JP" altLang="en-US" dirty="0"/>
+                <a:t>結果出力画面</a:t>
+              </a:r>
+              <a:endParaRPr kumimoji="1" lang="en-US" altLang="ja-JP" dirty="0"/>
+            </a:p>
+            <a:p>
+              <a:pPr marL="285750" indent="-285750" algn="ctr">
+                <a:buFont typeface="Arial" panose="020B0604020202020204" pitchFamily="34" charset="0"/>
+                <a:buChar char="•"/>
+              </a:pPr>
+              <a:endParaRPr kumimoji="1" lang="ja-JP" altLang="en-US" dirty="0"/>
+            </a:p>
+          </p:txBody>
+        </p:sp>
+        <p:sp>
+          <p:nvSpPr>
+            <p:cNvPr id="22" name="四角形: 角を丸くする 21">
+              <a:extLst>
+                <a:ext uri="{FF2B5EF4-FFF2-40B4-BE49-F238E27FC236}">
+                  <a16:creationId xmlns:a16="http://schemas.microsoft.com/office/drawing/2014/main" id="{1788D82B-806B-416D-9A81-8E0269B32405}"/>
+                </a:ext>
+              </a:extLst>
+            </p:cNvPr>
+            <p:cNvSpPr/>
+            <p:nvPr/>
+          </p:nvSpPr>
+          <p:spPr>
+            <a:xfrm>
+              <a:off x="8880415" y="4460688"/>
+              <a:ext cx="2599949" cy="1159544"/>
+            </a:xfrm>
+            <a:prstGeom prst="roundRect">
+              <a:avLst/>
+            </a:prstGeom>
+          </p:spPr>
+          <p:style>
+            <a:lnRef idx="2">
+              <a:schemeClr val="accent3">
+                <a:shade val="50000"/>
+              </a:schemeClr>
+            </a:lnRef>
+            <a:fillRef idx="1">
+              <a:schemeClr val="accent3"/>
+            </a:fillRef>
+            <a:effectRef idx="0">
+              <a:schemeClr val="accent3"/>
+            </a:effectRef>
+            <a:fontRef idx="minor">
+              <a:schemeClr val="lt1"/>
+            </a:fontRef>
+          </p:style>
+          <p:txBody>
+            <a:bodyPr rtlCol="0" anchor="ctr"/>
+            <a:lstStyle/>
+            <a:p>
+              <a:pPr algn="ctr"/>
+              <a:r>
+                <a:rPr lang="ja-JP" altLang="en-US" dirty="0"/>
+                <a:t>データ保存場所</a:t>
+              </a:r>
+              <a:endParaRPr lang="en-US" altLang="ja-JP" dirty="0"/>
+            </a:p>
+          </p:txBody>
+        </p:sp>
+      </p:grpSp>
+      <p:sp>
+        <p:nvSpPr>
+          <p:cNvPr id="25" name="正方形/長方形 24">
+            <a:extLst>
+              <a:ext uri="{FF2B5EF4-FFF2-40B4-BE49-F238E27FC236}">
+                <a16:creationId xmlns:a16="http://schemas.microsoft.com/office/drawing/2014/main" id="{D52DBE5E-357C-44BA-8EB1-4B61BEF4DE22}"/>
+              </a:ext>
+            </a:extLst>
+          </p:cNvPr>
+          <p:cNvSpPr/>
+          <p:nvPr/>
+        </p:nvSpPr>
+        <p:spPr>
+          <a:xfrm>
+            <a:off x="6577263" y="1700463"/>
+            <a:ext cx="1138990" cy="433137"/>
+          </a:xfrm>
+          <a:prstGeom prst="rect">
+            <a:avLst/>
+          </a:prstGeom>
+        </p:spPr>
+        <p:style>
+          <a:lnRef idx="2">
+            <a:schemeClr val="accent6"/>
+          </a:lnRef>
+          <a:fillRef idx="1">
+            <a:schemeClr val="lt1"/>
+          </a:fillRef>
+          <a:effectRef idx="0">
+            <a:schemeClr val="accent6"/>
+          </a:effectRef>
+          <a:fontRef idx="minor">
+            <a:schemeClr val="dk1"/>
+          </a:fontRef>
+        </p:style>
+        <p:txBody>
+          <a:bodyPr rtlCol="0" anchor="ctr"/>
+          <a:lstStyle/>
+          <a:p>
+            <a:pPr algn="ctr"/>
+            <a:r>
+              <a:rPr kumimoji="1" lang="en-US" altLang="ja-JP" sz="2400" dirty="0">
+                <a:latin typeface="Arial Black" panose="020B0A04020102020204" pitchFamily="34" charset="0"/>
+              </a:rPr>
               <a:t>Flask</a:t>
             </a:r>
-            <a:r>
-              <a:rPr kumimoji="1" lang="ja-JP" altLang="en-US" sz="2400" dirty="0"/>
-              <a:t>という</a:t>
-            </a:r>
-            <a:r>
-              <a:rPr kumimoji="1" lang="en-US" altLang="ja-JP" sz="2400" dirty="0"/>
-              <a:t>Python</a:t>
-            </a:r>
-            <a:r>
-              <a:rPr kumimoji="1" lang="ja-JP" altLang="en-US" sz="2400" dirty="0"/>
-              <a:t>のライブラリを使い</a:t>
-            </a:r>
-            <a:r>
-              <a:rPr lang="ja-JP" altLang="en-US" sz="2400" dirty="0"/>
-              <a:t>実装</a:t>
-            </a:r>
-            <a:endParaRPr kumimoji="1" lang="ja-JP" altLang="en-US" sz="2400" dirty="0"/>
+            <a:endParaRPr kumimoji="1" lang="ja-JP" altLang="en-US" sz="2400" dirty="0">
+              <a:latin typeface="Arial Black" panose="020B0A04020102020204" pitchFamily="34" charset="0"/>
+            </a:endParaRPr>
+          </a:p>
+        </p:txBody>
+      </p:sp>
+      <p:sp>
+        <p:nvSpPr>
+          <p:cNvPr id="27" name="テキスト ボックス 26">
+            <a:extLst>
+              <a:ext uri="{FF2B5EF4-FFF2-40B4-BE49-F238E27FC236}">
+                <a16:creationId xmlns:a16="http://schemas.microsoft.com/office/drawing/2014/main" id="{4BA03AC9-8821-48AC-BA65-0549CDC13148}"/>
+              </a:ext>
+            </a:extLst>
+          </p:cNvPr>
+          <p:cNvSpPr txBox="1"/>
+          <p:nvPr/>
+        </p:nvSpPr>
+        <p:spPr>
+          <a:xfrm>
+            <a:off x="3939840" y="3578097"/>
+            <a:ext cx="1718456" cy="369332"/>
+          </a:xfrm>
+          <a:prstGeom prst="rect">
+            <a:avLst/>
+          </a:prstGeom>
+          <a:noFill/>
+        </p:spPr>
+        <p:txBody>
+          <a:bodyPr wrap="square" rtlCol="0">
+            <a:spAutoFit/>
+          </a:bodyPr>
+          <a:lstStyle/>
+          <a:p>
+            <a:pPr algn="ctr"/>
+            <a:r>
+              <a:rPr kumimoji="1" lang="ja-JP" altLang="en-US" dirty="0"/>
+              <a:t>サーバ</a:t>
+            </a:r>
           </a:p>
         </p:txBody>
       </p:sp>
@@ -5485,13 +6201,13 @@
   <p:clrMapOvr>
     <a:masterClrMapping/>
   </p:clrMapOvr>
-  <mc:AlternateContent xmlns:mc="http://schemas.openxmlformats.org/markup-compatibility/2006">
-    <mc:Choice xmlns:p14="http://schemas.microsoft.com/office/powerpoint/2010/main" Requires="p14">
+  <mc:AlternateContent xmlns:mc="http://schemas.openxmlformats.org/markup-compatibility/2006" xmlns:p14="http://schemas.microsoft.com/office/powerpoint/2010/main">
+    <mc:Choice Requires="p14">
       <p:transition spd="slow" p14:dur="800">
         <p:circle/>
       </p:transition>
     </mc:Choice>
-    <mc:Fallback>
+    <mc:Fallback xmlns="">
       <p:transition spd="slow">
         <p:circle/>
       </p:transition>
@@ -5567,7 +6283,7 @@
         <p:spPr>
           <a:xfrm>
             <a:off x="838200" y="1834243"/>
-            <a:ext cx="10850217" cy="1754326"/>
+            <a:ext cx="10850217" cy="2862322"/>
           </a:xfrm>
           <a:prstGeom prst="rect">
             <a:avLst/>
@@ -5603,10 +6319,24 @@
               <a:buFont typeface="+mj-lt"/>
               <a:buAutoNum type="arabicPeriod"/>
             </a:pPr>
+            <a:endParaRPr lang="en-US" altLang="ja-JP" sz="3600" dirty="0"/>
+          </a:p>
+          <a:p>
+            <a:pPr marL="342900" indent="-342900">
+              <a:buFont typeface="+mj-lt"/>
+              <a:buAutoNum type="arabicPeriod"/>
+            </a:pPr>
             <a:r>
               <a:rPr lang="ja-JP" altLang="en-US" sz="3600" dirty="0"/>
               <a:t>サーバに送信</a:t>
             </a:r>
+            <a:endParaRPr lang="en-US" altLang="ja-JP" sz="3600" dirty="0"/>
+          </a:p>
+          <a:p>
+            <a:pPr marL="342900" indent="-342900">
+              <a:buFont typeface="+mj-lt"/>
+              <a:buAutoNum type="arabicPeriod"/>
+            </a:pPr>
             <a:endParaRPr kumimoji="1" lang="en-US" altLang="ja-JP" sz="3600" dirty="0"/>
           </a:p>
           <a:p>
@@ -5632,13 +6362,13 @@
   <p:clrMapOvr>
     <a:masterClrMapping/>
   </p:clrMapOvr>
-  <mc:AlternateContent xmlns:mc="http://schemas.openxmlformats.org/markup-compatibility/2006">
-    <mc:Choice xmlns:p14="http://schemas.microsoft.com/office/powerpoint/2010/main" Requires="p14">
+  <mc:AlternateContent xmlns:mc="http://schemas.openxmlformats.org/markup-compatibility/2006" xmlns:p14="http://schemas.microsoft.com/office/powerpoint/2010/main">
+    <mc:Choice Requires="p14">
       <p:transition spd="slow" p14:dur="800">
         <p:circle/>
       </p:transition>
     </mc:Choice>
-    <mc:Fallback>
+    <mc:Fallback xmlns="">
       <p:transition spd="slow">
         <p:circle/>
       </p:transition>
@@ -5683,12 +6413,12 @@
         <p:spPr>
           <a:xfrm>
             <a:off x="824698" y="312565"/>
-            <a:ext cx="9373866" cy="1293028"/>
+            <a:ext cx="10529102" cy="1293028"/>
           </a:xfrm>
         </p:spPr>
         <p:txBody>
           <a:bodyPr>
-            <a:normAutofit fontScale="90000"/>
+            <a:normAutofit/>
           </a:bodyPr>
           <a:lstStyle/>
           <a:p>
@@ -5697,12 +6427,12 @@
               <a:buAutoNum type="arabicPeriod"/>
             </a:pPr>
             <a:r>
-              <a:rPr kumimoji="1" lang="en-US" altLang="ja-JP" dirty="0"/>
+              <a:rPr kumimoji="1" lang="en-US" altLang="ja-JP" sz="3600" dirty="0"/>
               <a:t>Web</a:t>
             </a:r>
             <a:r>
-              <a:rPr kumimoji="1" lang="ja-JP" altLang="en-US" dirty="0"/>
-              <a:t>ページ上の鍵盤で作曲して送信</a:t>
+              <a:rPr kumimoji="1" lang="ja-JP" altLang="en-US" sz="3600" dirty="0"/>
+              <a:t>ページ上の鍵盤で短いメロディを入力</a:t>
             </a:r>
           </a:p>
         </p:txBody>
@@ -5737,7 +6467,7 @@
         </p:blipFill>
         <p:spPr>
           <a:xfrm>
-            <a:off x="1123949" y="3519100"/>
+            <a:off x="904570" y="3397275"/>
             <a:ext cx="9944100" cy="2133600"/>
           </a:xfrm>
         </p:spPr>
@@ -5824,7 +6554,7 @@
         </p:blipFill>
         <p:spPr>
           <a:xfrm>
-            <a:off x="2132334" y="1737245"/>
+            <a:off x="1912955" y="1490651"/>
             <a:ext cx="7927331" cy="1923298"/>
           </a:xfrm>
           <a:prstGeom prst="rect">
@@ -5871,47 +6601,6 @@
           </a:p>
         </p:txBody>
       </p:sp>
-      <p:sp>
-        <p:nvSpPr>
-          <p:cNvPr id="24" name="テキスト ボックス 23">
-            <a:extLst>
-              <a:ext uri="{FF2B5EF4-FFF2-40B4-BE49-F238E27FC236}">
-                <a16:creationId xmlns:a16="http://schemas.microsoft.com/office/drawing/2014/main" id="{CC2F4E9E-E77D-4EBB-A9E8-858EFC0F5752}"/>
-              </a:ext>
-            </a:extLst>
-          </p:cNvPr>
-          <p:cNvSpPr txBox="1"/>
-          <p:nvPr/>
-        </p:nvSpPr>
-        <p:spPr>
-          <a:xfrm>
-            <a:off x="9840286" y="5652700"/>
-            <a:ext cx="2588130" cy="276999"/>
-          </a:xfrm>
-          <a:prstGeom prst="rect">
-            <a:avLst/>
-          </a:prstGeom>
-          <a:noFill/>
-        </p:spPr>
-        <p:txBody>
-          <a:bodyPr wrap="square" rtlCol="0">
-            <a:spAutoFit/>
-          </a:bodyPr>
-          <a:lstStyle/>
-          <a:p>
-            <a:r>
-              <a:rPr kumimoji="1" lang="ja-JP" altLang="en-US" sz="1200" dirty="0">
-                <a:hlinkClick r:id="rId5"/>
-              </a:rPr>
-              <a:t>来夢来人</a:t>
-            </a:r>
-            <a:r>
-              <a:rPr kumimoji="1" lang="ja-JP" altLang="en-US" sz="1200" dirty="0"/>
-              <a:t>より引用</a:t>
-            </a:r>
-          </a:p>
-        </p:txBody>
-      </p:sp>
       <p:pic>
         <p:nvPicPr>
           <p:cNvPr id="5" name="図 4">
@@ -5927,7 +6616,7 @@
           <p:nvPr/>
         </p:nvPicPr>
         <p:blipFill>
-          <a:blip r:embed="rId6">
+          <a:blip r:embed="rId5">
             <a:extLst>
               <a:ext uri="{28A0092B-C50C-407E-A947-70E740481C1C}">
                 <a14:useLocalDpi xmlns:a14="http://schemas.microsoft.com/office/drawing/2010/main" val="0"/>
@@ -5940,7 +6629,7 @@
         </p:blipFill>
         <p:spPr>
           <a:xfrm>
-            <a:off x="11134351" y="5042895"/>
+            <a:off x="11143229" y="5006186"/>
             <a:ext cx="700502" cy="400287"/>
           </a:xfrm>
           <a:prstGeom prst="rect">
@@ -5948,6 +6637,45 @@
           </a:prstGeom>
         </p:spPr>
       </p:pic>
+      <p:sp>
+        <p:nvSpPr>
+          <p:cNvPr id="6" name="テキスト ボックス 5">
+            <a:extLst>
+              <a:ext uri="{FF2B5EF4-FFF2-40B4-BE49-F238E27FC236}">
+                <a16:creationId xmlns:a16="http://schemas.microsoft.com/office/drawing/2014/main" id="{54D5D598-9E09-43BB-B516-8A847E34B839}"/>
+              </a:ext>
+            </a:extLst>
+          </p:cNvPr>
+          <p:cNvSpPr txBox="1"/>
+          <p:nvPr/>
+        </p:nvSpPr>
+        <p:spPr>
+          <a:xfrm>
+            <a:off x="577516" y="5652700"/>
+            <a:ext cx="8807784" cy="646331"/>
+          </a:xfrm>
+          <a:prstGeom prst="rect">
+            <a:avLst/>
+          </a:prstGeom>
+          <a:noFill/>
+        </p:spPr>
+        <p:txBody>
+          <a:bodyPr wrap="square" rtlCol="0">
+            <a:spAutoFit/>
+          </a:bodyPr>
+          <a:lstStyle/>
+          <a:p>
+            <a:r>
+              <a:rPr kumimoji="1" lang="en-US" altLang="ja-JP" sz="3600" dirty="0"/>
+              <a:t>2. </a:t>
+            </a:r>
+            <a:r>
+              <a:rPr kumimoji="1" lang="ja-JP" altLang="en-US" sz="3600" dirty="0"/>
+              <a:t>サーバに送信</a:t>
+            </a:r>
+          </a:p>
+        </p:txBody>
+      </p:sp>
     </p:spTree>
     <p:extLst>
       <p:ext uri="{BB962C8B-B14F-4D97-AF65-F5344CB8AC3E}">
@@ -5958,13 +6686,13 @@
   <p:clrMapOvr>
     <a:masterClrMapping/>
   </p:clrMapOvr>
-  <mc:AlternateContent xmlns:mc="http://schemas.openxmlformats.org/markup-compatibility/2006">
-    <mc:Choice xmlns:p14="http://schemas.microsoft.com/office/powerpoint/2010/main" Requires="p14">
+  <mc:AlternateContent xmlns:mc="http://schemas.openxmlformats.org/markup-compatibility/2006" xmlns:p14="http://schemas.microsoft.com/office/powerpoint/2010/main">
+    <mc:Choice Requires="p14">
       <p:transition spd="slow" p14:dur="800">
         <p:circle/>
       </p:transition>
     </mc:Choice>
-    <mc:Fallback>
+    <mc:Fallback xmlns="">
       <p:transition spd="slow">
         <p:circle/>
       </p:transition>
@@ -6061,8 +6789,8 @@
         </p:blipFill>
         <p:spPr bwMode="auto">
           <a:xfrm>
-            <a:off x="4005540" y="1825625"/>
-            <a:ext cx="4180920" cy="4351338"/>
+            <a:off x="8593582" y="2940598"/>
+            <a:ext cx="3328922" cy="3464612"/>
           </a:xfrm>
           <a:prstGeom prst="rect">
             <a:avLst/>
@@ -6093,8 +6821,8 @@
         </p:nvSpPr>
         <p:spPr>
           <a:xfrm>
-            <a:off x="838200" y="2133600"/>
-            <a:ext cx="6839454" cy="369332"/>
+            <a:off x="838200" y="2828835"/>
+            <a:ext cx="7166811" cy="1200329"/>
           </a:xfrm>
           <a:prstGeom prst="rect">
             <a:avLst/>
@@ -6108,18 +6836,18 @@
           <a:lstStyle/>
           <a:p>
             <a:r>
-              <a:rPr kumimoji="1" lang="ja-JP" altLang="en-US" dirty="0"/>
+              <a:rPr kumimoji="1" lang="ja-JP" altLang="en-US" sz="3600" dirty="0"/>
               <a:t>結果出力ページに</a:t>
             </a:r>
             <a:r>
-              <a:rPr kumimoji="1" lang="en-US" altLang="ja-JP" dirty="0"/>
+              <a:rPr kumimoji="1" lang="en-US" altLang="ja-JP" sz="3600" dirty="0"/>
               <a:t>AI</a:t>
             </a:r>
             <a:r>
-              <a:rPr kumimoji="1" lang="ja-JP" altLang="en-US" dirty="0"/>
+              <a:rPr kumimoji="1" lang="ja-JP" altLang="en-US" sz="3600" dirty="0"/>
               <a:t>が作った曲が送信されているのでそこで聴く</a:t>
             </a:r>
-            <a:endParaRPr kumimoji="1" lang="en-US" altLang="ja-JP" dirty="0"/>
+            <a:endParaRPr kumimoji="1" lang="en-US" altLang="ja-JP" sz="3600" dirty="0"/>
           </a:p>
         </p:txBody>
       </p:sp>
@@ -6133,13 +6861,13 @@
   <p:clrMapOvr>
     <a:masterClrMapping/>
   </p:clrMapOvr>
-  <mc:AlternateContent xmlns:mc="http://schemas.openxmlformats.org/markup-compatibility/2006">
-    <mc:Choice xmlns:p14="http://schemas.microsoft.com/office/powerpoint/2010/main" Requires="p14">
+  <mc:AlternateContent xmlns:mc="http://schemas.openxmlformats.org/markup-compatibility/2006" xmlns:p14="http://schemas.microsoft.com/office/powerpoint/2010/main">
+    <mc:Choice Requires="p14">
       <p:transition spd="slow" p14:dur="800">
         <p:circle/>
       </p:transition>
     </mc:Choice>
-    <mc:Fallback>
+    <mc:Fallback xmlns="">
       <p:transition spd="slow">
         <p:circle/>
       </p:transition>
@@ -6199,9 +6927,10 @@
               <a:t>AI</a:t>
             </a:r>
             <a:r>
-              <a:rPr kumimoji="1" lang="ja-JP" altLang="en-US" dirty="0"/>
-              <a:t>の学習</a:t>
-            </a:r>
+              <a:rPr lang="ja-JP" altLang="en-US" dirty="0"/>
+              <a:t>について</a:t>
+            </a:r>
+            <a:endParaRPr kumimoji="1" lang="ja-JP" altLang="en-US" dirty="0"/>
           </a:p>
         </p:txBody>
       </p:sp>
@@ -6219,8 +6948,8 @@
         </p:nvSpPr>
         <p:spPr>
           <a:xfrm>
-            <a:off x="875727" y="2104824"/>
-            <a:ext cx="10527632" cy="2677656"/>
+            <a:off x="374072" y="2104824"/>
+            <a:ext cx="11471563" cy="3539430"/>
           </a:xfrm>
           <a:prstGeom prst="rect">
             <a:avLst/>
@@ -6247,7 +6976,7 @@
             </a:r>
             <a:r>
               <a:rPr lang="ja-JP" altLang="en-US" sz="2400" dirty="0"/>
-              <a:t>のなかに出現するドやレなどの音を学習</a:t>
+              <a:t>のなかに出現する音のパターンを学習</a:t>
             </a:r>
             <a:endParaRPr lang="en-US" altLang="ja-JP" sz="2400" dirty="0"/>
           </a:p>
@@ -6265,7 +6994,15 @@
             </a:pPr>
             <a:r>
               <a:rPr lang="ja-JP" altLang="en-US" sz="2400" dirty="0"/>
-              <a:t>音のパターンを学習してそれに合わせるよう作曲できるようになる</a:t>
+              <a:t>入力されたメロディにつなげて</a:t>
+            </a:r>
+            <a:r>
+              <a:rPr lang="en-US" altLang="ja-JP" sz="2400" dirty="0"/>
+              <a:t>AI</a:t>
+            </a:r>
+            <a:r>
+              <a:rPr lang="ja-JP" altLang="en-US" sz="2400" dirty="0"/>
+              <a:t>が音を自動的に作る</a:t>
             </a:r>
             <a:endParaRPr lang="en-US" altLang="ja-JP" sz="2400" dirty="0"/>
           </a:p>
@@ -6306,6 +7043,29 @@
           <a:p>
             <a:pPr lvl="1"/>
             <a:endParaRPr lang="en-US" altLang="ja-JP" sz="2400" dirty="0"/>
+          </a:p>
+          <a:p>
+            <a:pPr lvl="1"/>
+            <a:r>
+              <a:rPr lang="en-US" altLang="ja-JP" sz="2800" dirty="0"/>
+              <a:t>midi </a:t>
+            </a:r>
+            <a:r>
+              <a:rPr lang="ja-JP" altLang="en-US" sz="2000" dirty="0"/>
+              <a:t>・・・</a:t>
+            </a:r>
+            <a:r>
+              <a:rPr lang="ja-JP" altLang="en-US" sz="2800" dirty="0"/>
+              <a:t>楽器や音などがデータとして入っている。コンピュータ上</a:t>
+            </a:r>
+            <a:r>
+              <a:rPr lang="en-US" altLang="ja-JP" sz="2800" dirty="0"/>
+              <a:t>		  </a:t>
+            </a:r>
+            <a:r>
+              <a:rPr lang="ja-JP" altLang="en-US" sz="2800" dirty="0"/>
+              <a:t>で編集・再生ができる</a:t>
+            </a:r>
           </a:p>
         </p:txBody>
       </p:sp>
@@ -6319,13 +7079,13 @@
   <p:clrMapOvr>
     <a:masterClrMapping/>
   </p:clrMapOvr>
-  <mc:AlternateContent xmlns:mc="http://schemas.openxmlformats.org/markup-compatibility/2006">
-    <mc:Choice xmlns:p14="http://schemas.microsoft.com/office/powerpoint/2010/main" Requires="p14">
+  <mc:AlternateContent xmlns:mc="http://schemas.openxmlformats.org/markup-compatibility/2006" xmlns:p14="http://schemas.microsoft.com/office/powerpoint/2010/main">
+    <mc:Choice Requires="p14">
       <p:transition spd="slow" p14:dur="800">
         <p:circle/>
       </p:transition>
     </mc:Choice>
-    <mc:Fallback>
+    <mc:Fallback xmlns="">
       <p:transition spd="slow">
         <p:circle/>
       </p:transition>
@@ -6369,8 +7129,8 @@
         </p:nvSpPr>
         <p:spPr>
           <a:xfrm>
-            <a:off x="383098" y="704675"/>
-            <a:ext cx="9144000" cy="744890"/>
+            <a:off x="425138" y="555042"/>
+            <a:ext cx="11173303" cy="744890"/>
           </a:xfrm>
         </p:spPr>
         <p:txBody>
@@ -6382,7 +7142,7 @@
             <a:pPr algn="l"/>
             <a:r>
               <a:rPr kumimoji="1" lang="en-US" altLang="ja-JP" sz="4400" dirty="0"/>
-              <a:t>DNN</a:t>
+              <a:t>DNN (Deep Neural Network)</a:t>
             </a:r>
             <a:r>
               <a:rPr kumimoji="1" lang="ja-JP" altLang="en-US" sz="4400" dirty="0"/>
@@ -6409,8 +7169,8 @@
         </p:nvSpPr>
         <p:spPr>
           <a:xfrm>
-            <a:off x="1524000" y="2583543"/>
-            <a:ext cx="9144000" cy="3656835"/>
+            <a:off x="425138" y="1600582"/>
+            <a:ext cx="11341722" cy="4880429"/>
           </a:xfrm>
         </p:spPr>
         <p:txBody>
@@ -6419,6 +7179,80 @@
           </a:bodyPr>
           <a:lstStyle/>
           <a:p>
+            <a:pPr marL="342900" indent="-342900" algn="l">
+              <a:buFont typeface="Arial" panose="020B0604020202020204" pitchFamily="34" charset="0"/>
+              <a:buChar char="•"/>
+            </a:pPr>
+            <a:r>
+              <a:rPr kumimoji="1" lang="ja-JP" altLang="en-US" sz="3200" dirty="0"/>
+              <a:t>ニューラルネットワーク</a:t>
+            </a:r>
+            <a:endParaRPr lang="en-US" altLang="ja-JP" sz="3200" dirty="0"/>
+          </a:p>
+          <a:p>
+            <a:pPr marL="800100" lvl="1" indent="-342900" algn="l">
+              <a:buFont typeface="Arial" panose="020B0604020202020204" pitchFamily="34" charset="0"/>
+              <a:buChar char="•"/>
+            </a:pPr>
+            <a:r>
+              <a:rPr lang="ja-JP" altLang="en-US" sz="2800" dirty="0"/>
+              <a:t>階層構造になっており、入力層と中間層、出力層に分かれている</a:t>
+            </a:r>
+            <a:endParaRPr lang="en-US" altLang="ja-JP" sz="2800" dirty="0"/>
+          </a:p>
+          <a:p>
+            <a:pPr marL="800100" lvl="1" indent="-342900" algn="l">
+              <a:buFont typeface="Arial" panose="020B0604020202020204" pitchFamily="34" charset="0"/>
+              <a:buChar char="•"/>
+            </a:pPr>
+            <a:r>
+              <a:rPr lang="ja-JP" altLang="en-US" sz="2800" dirty="0"/>
+              <a:t>層の中には複数の粒があり、それぞれの粒のなかで処理をする</a:t>
+            </a:r>
+            <a:endParaRPr lang="en-US" altLang="ja-JP" sz="2800" dirty="0"/>
+          </a:p>
+          <a:p>
+            <a:pPr marL="800100" lvl="1" indent="-342900" algn="l">
+              <a:buFont typeface="Arial" panose="020B0604020202020204" pitchFamily="34" charset="0"/>
+              <a:buChar char="•"/>
+            </a:pPr>
+            <a:r>
+              <a:rPr lang="ja-JP" altLang="en-US" sz="2800" dirty="0"/>
+              <a:t>一つの粒は複数の粒からの出力を合わせて処理をする</a:t>
+            </a:r>
+            <a:endParaRPr lang="en-US" altLang="ja-JP" sz="2800" dirty="0"/>
+          </a:p>
+          <a:p>
+            <a:pPr marL="800100" lvl="1" indent="-342900" algn="l">
+              <a:buFont typeface="Arial" panose="020B0604020202020204" pitchFamily="34" charset="0"/>
+              <a:buChar char="•"/>
+            </a:pPr>
+            <a:r>
+              <a:rPr lang="ja-JP" altLang="en-US" sz="2800" dirty="0"/>
+              <a:t>中間層では入力に計算を施して出力層に渡して判断してもらう</a:t>
+            </a:r>
+            <a:endParaRPr lang="en-US" altLang="ja-JP" sz="2800" dirty="0"/>
+          </a:p>
+          <a:p>
+            <a:pPr marL="800100" lvl="1" indent="-342900" algn="l">
+              <a:buFont typeface="Arial" panose="020B0604020202020204" pitchFamily="34" charset="0"/>
+              <a:buChar char="•"/>
+            </a:pPr>
+            <a:endParaRPr lang="ja-JP" altLang="en-US" sz="2800" dirty="0"/>
+          </a:p>
+          <a:p>
+            <a:pPr marL="342900" indent="-342900" algn="l">
+              <a:buFont typeface="Arial" panose="020B0604020202020204" pitchFamily="34" charset="0"/>
+              <a:buChar char="•"/>
+            </a:pPr>
+            <a:r>
+              <a:rPr lang="en-US" altLang="ja-JP" dirty="0"/>
+              <a:t>DNN</a:t>
+            </a:r>
+            <a:r>
+              <a:rPr lang="ja-JP" altLang="en-US" dirty="0"/>
+              <a:t>は中間層が複数あるネットワークを指す</a:t>
+            </a:r>
             <a:endParaRPr kumimoji="1" lang="ja-JP" altLang="en-US" dirty="0"/>
           </a:p>
         </p:txBody>
@@ -6433,13 +7267,13 @@
   <p:clrMapOvr>
     <a:masterClrMapping/>
   </p:clrMapOvr>
-  <mc:AlternateContent xmlns:mc="http://schemas.openxmlformats.org/markup-compatibility/2006">
-    <mc:Choice xmlns:p14="http://schemas.microsoft.com/office/powerpoint/2010/main" Requires="p14">
+  <mc:AlternateContent xmlns:mc="http://schemas.openxmlformats.org/markup-compatibility/2006" xmlns:p14="http://schemas.microsoft.com/office/powerpoint/2010/main">
+    <mc:Choice Requires="p14">
       <p:transition spd="slow" p14:dur="800">
         <p:circle/>
       </p:transition>
     </mc:Choice>
-    <mc:Fallback>
+    <mc:Fallback xmlns="">
       <p:transition spd="slow">
         <p:circle/>
       </p:transition>
@@ -6488,7 +7322,7 @@
           <a:p>
             <a:r>
               <a:rPr kumimoji="1" lang="en-US" altLang="ja-JP" dirty="0"/>
-              <a:t>LSTM</a:t>
+              <a:t>LSTM </a:t>
             </a:r>
             <a:r>
               <a:rPr kumimoji="1" lang="ja-JP" altLang="en-US" dirty="0"/>
@@ -6515,8 +7349,8 @@
         </p:nvSpPr>
         <p:spPr>
           <a:xfrm>
-            <a:off x="1393371" y="1901372"/>
-            <a:ext cx="8824686" cy="3817258"/>
+            <a:off x="838200" y="1901372"/>
+            <a:ext cx="10515601" cy="3817258"/>
           </a:xfrm>
         </p:spPr>
         <p:txBody>
@@ -6524,21 +7358,20 @@
           <a:lstStyle/>
           <a:p>
             <a:r>
+              <a:rPr lang="ja-JP" altLang="en-US" dirty="0"/>
+              <a:t>長・短期記憶という</a:t>
+            </a:r>
+            <a:r>
               <a:rPr lang="en-US" altLang="ja-JP" dirty="0"/>
-              <a:t>LSTM </a:t>
+              <a:t>DNN</a:t>
             </a:r>
             <a:r>
               <a:rPr lang="ja-JP" altLang="en-US" dirty="0"/>
-              <a:t>（</a:t>
-            </a:r>
-            <a:r>
-              <a:rPr lang="en-US" altLang="ja-JP" dirty="0"/>
-              <a:t>Long Short-Term Memory: </a:t>
-            </a:r>
-            <a:r>
-              <a:rPr lang="ja-JP" altLang="en-US" dirty="0"/>
-              <a:t>長・短期記憶）ネットワークは、</a:t>
-            </a:r>
+              <a:t>の層の一種</a:t>
+            </a:r>
+            <a:endParaRPr lang="en-US" altLang="ja-JP" dirty="0"/>
+          </a:p>
+          <a:p>
             <a:r>
               <a:rPr lang="en-US" altLang="ja-JP" dirty="0"/>
               <a:t>RNN</a:t>
@@ -6547,7 +7380,7 @@
               <a:rPr lang="ja-JP" altLang="en-US" dirty="0"/>
               <a:t>（再帰型 ニューラルネットワーク） の一種です。</a:t>
             </a:r>
-            <a:endParaRPr kumimoji="1" lang="ja-JP" altLang="en-US" dirty="0"/>
+            <a:endParaRPr lang="en-US" altLang="ja-JP" dirty="0"/>
           </a:p>
         </p:txBody>
       </p:sp>
@@ -6561,13 +7394,13 @@
   <p:clrMapOvr>
     <a:masterClrMapping/>
   </p:clrMapOvr>
-  <mc:AlternateContent xmlns:mc="http://schemas.openxmlformats.org/markup-compatibility/2006">
-    <mc:Choice xmlns:p14="http://schemas.microsoft.com/office/powerpoint/2010/main" Requires="p14">
+  <mc:AlternateContent xmlns:mc="http://schemas.openxmlformats.org/markup-compatibility/2006" xmlns:p14="http://schemas.microsoft.com/office/powerpoint/2010/main">
+    <mc:Choice Requires="p14">
       <p:transition spd="slow" p14:dur="800">
         <p:circle/>
       </p:transition>
     </mc:Choice>
-    <mc:Fallback>
+    <mc:Fallback xmlns="">
       <p:transition spd="slow">
         <p:circle/>
       </p:transition>

</xml_diff>